<commit_message>
To support the How to Post page
</commit_message>
<xml_diff>
--- a/image/howToPost.pptx
+++ b/image/howToPost.pptx
@@ -6,6 +6,7 @@
   </p:sldMasterIdLst>
   <p:sldIdLst>
     <p:sldId id="256" r:id="rId2"/>
+    <p:sldId id="257" r:id="rId3"/>
   </p:sldIdLst>
   <p:sldSz cx="6858000" cy="9144000" type="screen4x3"/>
   <p:notesSz cx="6858000" cy="9144000"/>
@@ -104,6 +105,11 @@
       </a:defRPr>
     </a:lvl9pPr>
   </p:defaultTextStyle>
+  <p:extLst>
+    <p:ext uri="{EFAFB233-063F-42B5-8137-9DF3F51BA10A}">
+      <p15:sldGuideLst xmlns:p15="http://schemas.microsoft.com/office/powerpoint/2012/main"/>
+    </p:ext>
+  </p:extLst>
 </p:presentation>
 </file>
 
@@ -111,17 +117,49 @@
 <pc:chgInfo xmlns:a="http://schemas.openxmlformats.org/drawingml/2006/main" xmlns:r="http://schemas.openxmlformats.org/officeDocument/2006/relationships" xmlns:ac="http://schemas.microsoft.com/office/drawing/2013/main/command" xmlns:pc="http://schemas.microsoft.com/office/powerpoint/2013/main/command">
   <pc:docChgLst>
     <pc:chgData name="George John" userId="1c7f5d7288d1a48b" providerId="LiveId" clId="{0144DF34-647E-4BF4-ABCB-FB17BAA507B1}"/>
-    <pc:docChg chg="custSel modSld">
-      <pc:chgData name="George John" userId="1c7f5d7288d1a48b" providerId="LiveId" clId="{0144DF34-647E-4BF4-ABCB-FB17BAA507B1}" dt="2023-10-23T21:08:57.206" v="0" actId="478"/>
+    <pc:docChg chg="undo custSel addSld modSld">
+      <pc:chgData name="George John" userId="1c7f5d7288d1a48b" providerId="LiveId" clId="{0144DF34-647E-4BF4-ABCB-FB17BAA507B1}" dt="2023-10-28T06:01:37.553" v="693" actId="1076"/>
       <pc:docMkLst>
         <pc:docMk/>
       </pc:docMkLst>
-      <pc:sldChg chg="delSp mod">
-        <pc:chgData name="George John" userId="1c7f5d7288d1a48b" providerId="LiveId" clId="{0144DF34-647E-4BF4-ABCB-FB17BAA507B1}" dt="2023-10-23T21:08:57.206" v="0" actId="478"/>
+      <pc:sldChg chg="addSp delSp modSp mod">
+        <pc:chgData name="George John" userId="1c7f5d7288d1a48b" providerId="LiveId" clId="{0144DF34-647E-4BF4-ABCB-FB17BAA507B1}" dt="2023-10-28T06:01:08.853" v="684" actId="1076"/>
         <pc:sldMkLst>
           <pc:docMk/>
           <pc:sldMk cId="2429365050" sldId="256"/>
         </pc:sldMkLst>
+        <pc:picChg chg="add del mod">
+          <ac:chgData name="George John" userId="1c7f5d7288d1a48b" providerId="LiveId" clId="{0144DF34-647E-4BF4-ABCB-FB17BAA507B1}" dt="2023-10-28T05:07:25.497" v="2" actId="21"/>
+          <ac:picMkLst>
+            <pc:docMk/>
+            <pc:sldMk cId="2429365050" sldId="256"/>
+            <ac:picMk id="3" creationId="{E4713D69-A02F-2BA2-1911-61C3A0477C45}"/>
+          </ac:picMkLst>
+        </pc:picChg>
+        <pc:picChg chg="add del mod">
+          <ac:chgData name="George John" userId="1c7f5d7288d1a48b" providerId="LiveId" clId="{0144DF34-647E-4BF4-ABCB-FB17BAA507B1}" dt="2023-10-28T05:08:06.366" v="9" actId="478"/>
+          <ac:picMkLst>
+            <pc:docMk/>
+            <pc:sldMk cId="2429365050" sldId="256"/>
+            <ac:picMk id="4" creationId="{7C8B85BB-96C1-FA6C-A7E3-B5E6EFF3BFBF}"/>
+          </ac:picMkLst>
+        </pc:picChg>
+        <pc:picChg chg="add del mod">
+          <ac:chgData name="George John" userId="1c7f5d7288d1a48b" providerId="LiveId" clId="{0144DF34-647E-4BF4-ABCB-FB17BAA507B1}" dt="2023-10-28T05:09:35.675" v="11" actId="21"/>
+          <ac:picMkLst>
+            <pc:docMk/>
+            <pc:sldMk cId="2429365050" sldId="256"/>
+            <ac:picMk id="6" creationId="{F66EEBDE-455A-E019-8A1D-00435F274D03}"/>
+          </ac:picMkLst>
+        </pc:picChg>
+        <pc:picChg chg="add mod">
+          <ac:chgData name="George John" userId="1c7f5d7288d1a48b" providerId="LiveId" clId="{0144DF34-647E-4BF4-ABCB-FB17BAA507B1}" dt="2023-10-28T06:01:08.853" v="684" actId="1076"/>
+          <ac:picMkLst>
+            <pc:docMk/>
+            <pc:sldMk cId="2429365050" sldId="256"/>
+            <ac:picMk id="7" creationId="{BD8D348B-9B09-85F0-598C-37F5739B0C29}"/>
+          </ac:picMkLst>
+        </pc:picChg>
         <pc:picChg chg="del">
           <ac:chgData name="George John" userId="1c7f5d7288d1a48b" providerId="LiveId" clId="{0144DF34-647E-4BF4-ABCB-FB17BAA507B1}" dt="2023-10-23T21:08:57.206" v="0" actId="478"/>
           <ac:picMkLst>
@@ -130,6 +168,157 @@
             <ac:picMk id="13" creationId="{B2F09005-9A78-98C8-91D3-39145B4F0441}"/>
           </ac:picMkLst>
         </pc:picChg>
+      </pc:sldChg>
+      <pc:sldChg chg="addSp delSp modSp new mod">
+        <pc:chgData name="George John" userId="1c7f5d7288d1a48b" providerId="LiveId" clId="{0144DF34-647E-4BF4-ABCB-FB17BAA507B1}" dt="2023-10-28T06:01:37.553" v="693" actId="1076"/>
+        <pc:sldMkLst>
+          <pc:docMk/>
+          <pc:sldMk cId="1926906025" sldId="257"/>
+        </pc:sldMkLst>
+        <pc:spChg chg="add mod">
+          <ac:chgData name="George John" userId="1c7f5d7288d1a48b" providerId="LiveId" clId="{0144DF34-647E-4BF4-ABCB-FB17BAA507B1}" dt="2023-10-28T05:52:23.219" v="531" actId="1036"/>
+          <ac:spMkLst>
+            <pc:docMk/>
+            <pc:sldMk cId="1926906025" sldId="257"/>
+            <ac:spMk id="4" creationId="{F219D5B5-8811-99AF-432E-5B6809E53C89}"/>
+          </ac:spMkLst>
+        </pc:spChg>
+        <pc:spChg chg="add del mod">
+          <ac:chgData name="George John" userId="1c7f5d7288d1a48b" providerId="LiveId" clId="{0144DF34-647E-4BF4-ABCB-FB17BAA507B1}" dt="2023-10-28T05:52:26.665" v="532" actId="478"/>
+          <ac:spMkLst>
+            <pc:docMk/>
+            <pc:sldMk cId="1926906025" sldId="257"/>
+            <ac:spMk id="9" creationId="{47442DE0-EF8A-67B1-5146-A0342BD16A99}"/>
+          </ac:spMkLst>
+        </pc:spChg>
+        <pc:spChg chg="add mod">
+          <ac:chgData name="George John" userId="1c7f5d7288d1a48b" providerId="LiveId" clId="{0144DF34-647E-4BF4-ABCB-FB17BAA507B1}" dt="2023-10-28T05:52:23.219" v="531" actId="1036"/>
+          <ac:spMkLst>
+            <pc:docMk/>
+            <pc:sldMk cId="1926906025" sldId="257"/>
+            <ac:spMk id="16" creationId="{A0196CB8-430D-1EAC-BA7F-15D670F1FCA0}"/>
+          </ac:spMkLst>
+        </pc:spChg>
+        <pc:spChg chg="add mod">
+          <ac:chgData name="George John" userId="1c7f5d7288d1a48b" providerId="LiveId" clId="{0144DF34-647E-4BF4-ABCB-FB17BAA507B1}" dt="2023-10-28T05:52:23.219" v="531" actId="1036"/>
+          <ac:spMkLst>
+            <pc:docMk/>
+            <pc:sldMk cId="1926906025" sldId="257"/>
+            <ac:spMk id="19" creationId="{8A069E48-CC44-9E08-4B2C-14E8D2FFA428}"/>
+          </ac:spMkLst>
+        </pc:spChg>
+        <pc:spChg chg="add mod ord">
+          <ac:chgData name="George John" userId="1c7f5d7288d1a48b" providerId="LiveId" clId="{0144DF34-647E-4BF4-ABCB-FB17BAA507B1}" dt="2023-10-28T05:57:09.818" v="677" actId="1036"/>
+          <ac:spMkLst>
+            <pc:docMk/>
+            <pc:sldMk cId="1926906025" sldId="257"/>
+            <ac:spMk id="22" creationId="{4EDC5607-476E-1575-78D8-64DE3FA82D0C}"/>
+          </ac:spMkLst>
+        </pc:spChg>
+        <pc:spChg chg="add del mod">
+          <ac:chgData name="George John" userId="1c7f5d7288d1a48b" providerId="LiveId" clId="{0144DF34-647E-4BF4-ABCB-FB17BAA507B1}" dt="2023-10-28T05:54:07.466" v="604" actId="478"/>
+          <ac:spMkLst>
+            <pc:docMk/>
+            <pc:sldMk cId="1926906025" sldId="257"/>
+            <ac:spMk id="24" creationId="{AB8193E7-9041-7DF8-FFDC-DE58ECA536C9}"/>
+          </ac:spMkLst>
+        </pc:spChg>
+        <pc:spChg chg="add mod">
+          <ac:chgData name="George John" userId="1c7f5d7288d1a48b" providerId="LiveId" clId="{0144DF34-647E-4BF4-ABCB-FB17BAA507B1}" dt="2023-10-28T05:55:01.616" v="632" actId="207"/>
+          <ac:spMkLst>
+            <pc:docMk/>
+            <pc:sldMk cId="1926906025" sldId="257"/>
+            <ac:spMk id="25" creationId="{505E09E8-2DB6-13EB-A3E4-C6D73A6060B6}"/>
+          </ac:spMkLst>
+        </pc:spChg>
+        <pc:picChg chg="add del mod">
+          <ac:chgData name="George John" userId="1c7f5d7288d1a48b" providerId="LiveId" clId="{0144DF34-647E-4BF4-ABCB-FB17BAA507B1}" dt="2023-10-28T05:16:30.278" v="72" actId="478"/>
+          <ac:picMkLst>
+            <pc:docMk/>
+            <pc:sldMk cId="1926906025" sldId="257"/>
+            <ac:picMk id="2" creationId="{930693D6-6EEF-7153-3CD9-282361C227E6}"/>
+          </ac:picMkLst>
+        </pc:picChg>
+        <pc:picChg chg="add del mod">
+          <ac:chgData name="George John" userId="1c7f5d7288d1a48b" providerId="LiveId" clId="{0144DF34-647E-4BF4-ABCB-FB17BAA507B1}" dt="2023-10-28T05:10:04.428" v="14" actId="478"/>
+          <ac:picMkLst>
+            <pc:docMk/>
+            <pc:sldMk cId="1926906025" sldId="257"/>
+            <ac:picMk id="3" creationId="{99481F05-774C-C5BD-447A-9019C8804341}"/>
+          </ac:picMkLst>
+        </pc:picChg>
+        <pc:picChg chg="add mod">
+          <ac:chgData name="George John" userId="1c7f5d7288d1a48b" providerId="LiveId" clId="{0144DF34-647E-4BF4-ABCB-FB17BAA507B1}" dt="2023-10-28T05:52:23.219" v="531" actId="1036"/>
+          <ac:picMkLst>
+            <pc:docMk/>
+            <pc:sldMk cId="1926906025" sldId="257"/>
+            <ac:picMk id="6" creationId="{EC35F343-EBB2-402B-5A4B-F8284FF1B895}"/>
+          </ac:picMkLst>
+        </pc:picChg>
+        <pc:picChg chg="add mod">
+          <ac:chgData name="George John" userId="1c7f5d7288d1a48b" providerId="LiveId" clId="{0144DF34-647E-4BF4-ABCB-FB17BAA507B1}" dt="2023-10-28T05:52:23.219" v="531" actId="1036"/>
+          <ac:picMkLst>
+            <pc:docMk/>
+            <pc:sldMk cId="1926906025" sldId="257"/>
+            <ac:picMk id="8" creationId="{27622E98-60DB-D4A1-0902-FA2B65448455}"/>
+          </ac:picMkLst>
+        </pc:picChg>
+        <pc:picChg chg="add del mod">
+          <ac:chgData name="George John" userId="1c7f5d7288d1a48b" providerId="LiveId" clId="{0144DF34-647E-4BF4-ABCB-FB17BAA507B1}" dt="2023-10-28T05:49:41.593" v="477" actId="478"/>
+          <ac:picMkLst>
+            <pc:docMk/>
+            <pc:sldMk cId="1926906025" sldId="257"/>
+            <ac:picMk id="11" creationId="{D27F25D7-139D-EB58-590D-69500E70F685}"/>
+          </ac:picMkLst>
+        </pc:picChg>
+        <pc:picChg chg="add mod">
+          <ac:chgData name="George John" userId="1c7f5d7288d1a48b" providerId="LiveId" clId="{0144DF34-647E-4BF4-ABCB-FB17BAA507B1}" dt="2023-10-28T05:52:23.219" v="531" actId="1036"/>
+          <ac:picMkLst>
+            <pc:docMk/>
+            <pc:sldMk cId="1926906025" sldId="257"/>
+            <ac:picMk id="13" creationId="{D79BC184-8F5F-1D5D-347B-F1E551AC7D68}"/>
+          </ac:picMkLst>
+        </pc:picChg>
+        <pc:picChg chg="add mod">
+          <ac:chgData name="George John" userId="1c7f5d7288d1a48b" providerId="LiveId" clId="{0144DF34-647E-4BF4-ABCB-FB17BAA507B1}" dt="2023-10-28T05:52:23.219" v="531" actId="1036"/>
+          <ac:picMkLst>
+            <pc:docMk/>
+            <pc:sldMk cId="1926906025" sldId="257"/>
+            <ac:picMk id="15" creationId="{A0626C39-C368-E88E-863E-FFBD07231980}"/>
+          </ac:picMkLst>
+        </pc:picChg>
+        <pc:picChg chg="add mod">
+          <ac:chgData name="George John" userId="1c7f5d7288d1a48b" providerId="LiveId" clId="{0144DF34-647E-4BF4-ABCB-FB17BAA507B1}" dt="2023-10-28T05:52:23.219" v="531" actId="1036"/>
+          <ac:picMkLst>
+            <pc:docMk/>
+            <pc:sldMk cId="1926906025" sldId="257"/>
+            <ac:picMk id="18" creationId="{D1164090-9041-6189-18F9-E26EA055CD7F}"/>
+          </ac:picMkLst>
+        </pc:picChg>
+        <pc:picChg chg="add mod">
+          <ac:chgData name="George John" userId="1c7f5d7288d1a48b" providerId="LiveId" clId="{0144DF34-647E-4BF4-ABCB-FB17BAA507B1}" dt="2023-10-28T06:01:37.553" v="693" actId="1076"/>
+          <ac:picMkLst>
+            <pc:docMk/>
+            <pc:sldMk cId="1926906025" sldId="257"/>
+            <ac:picMk id="30" creationId="{12E57019-AEBA-EA26-A80D-A1839AE2ABB2}"/>
+          </ac:picMkLst>
+        </pc:picChg>
+        <pc:cxnChg chg="add mod">
+          <ac:chgData name="George John" userId="1c7f5d7288d1a48b" providerId="LiveId" clId="{0144DF34-647E-4BF4-ABCB-FB17BAA507B1}" dt="2023-10-28T05:52:23.219" v="531" actId="1036"/>
+          <ac:cxnSpMkLst>
+            <pc:docMk/>
+            <pc:sldMk cId="1926906025" sldId="257"/>
+            <ac:cxnSpMk id="20" creationId="{BF107E5E-13FC-A8EF-A646-94047B4BCF46}"/>
+          </ac:cxnSpMkLst>
+        </pc:cxnChg>
+        <pc:cxnChg chg="add mod ord">
+          <ac:chgData name="George John" userId="1c7f5d7288d1a48b" providerId="LiveId" clId="{0144DF34-647E-4BF4-ABCB-FB17BAA507B1}" dt="2023-10-28T05:57:13.912" v="678" actId="14100"/>
+          <ac:cxnSpMkLst>
+            <pc:docMk/>
+            <pc:sldMk cId="1926906025" sldId="257"/>
+            <ac:cxnSpMk id="23" creationId="{9CEEA6AF-3B91-9FBD-559E-8923C98A58EA}"/>
+          </ac:cxnSpMkLst>
+        </pc:cxnChg>
       </pc:sldChg>
     </pc:docChg>
   </pc:docChgLst>
@@ -267,7 +456,7 @@
           <a:p>
             <a:fld id="{EA307E68-3151-4021-8034-6905DEC8B993}" type="datetimeFigureOut">
               <a:rPr lang="en-US" smtClean="0"/>
-              <a:t>10/23/2023</a:t>
+              <a:t>10/27/2023</a:t>
             </a:fld>
             <a:endParaRPr lang="en-US"/>
           </a:p>
@@ -437,7 +626,7 @@
           <a:p>
             <a:fld id="{EA307E68-3151-4021-8034-6905DEC8B993}" type="datetimeFigureOut">
               <a:rPr lang="en-US" smtClean="0"/>
-              <a:t>10/23/2023</a:t>
+              <a:t>10/27/2023</a:t>
             </a:fld>
             <a:endParaRPr lang="en-US"/>
           </a:p>
@@ -617,7 +806,7 @@
           <a:p>
             <a:fld id="{EA307E68-3151-4021-8034-6905DEC8B993}" type="datetimeFigureOut">
               <a:rPr lang="en-US" smtClean="0"/>
-              <a:t>10/23/2023</a:t>
+              <a:t>10/27/2023</a:t>
             </a:fld>
             <a:endParaRPr lang="en-US"/>
           </a:p>
@@ -787,7 +976,7 @@
           <a:p>
             <a:fld id="{EA307E68-3151-4021-8034-6905DEC8B993}" type="datetimeFigureOut">
               <a:rPr lang="en-US" smtClean="0"/>
-              <a:t>10/23/2023</a:t>
+              <a:t>10/27/2023</a:t>
             </a:fld>
             <a:endParaRPr lang="en-US"/>
           </a:p>
@@ -1031,7 +1220,7 @@
           <a:p>
             <a:fld id="{EA307E68-3151-4021-8034-6905DEC8B993}" type="datetimeFigureOut">
               <a:rPr lang="en-US" smtClean="0"/>
-              <a:t>10/23/2023</a:t>
+              <a:t>10/27/2023</a:t>
             </a:fld>
             <a:endParaRPr lang="en-US"/>
           </a:p>
@@ -1263,7 +1452,7 @@
           <a:p>
             <a:fld id="{EA307E68-3151-4021-8034-6905DEC8B993}" type="datetimeFigureOut">
               <a:rPr lang="en-US" smtClean="0"/>
-              <a:t>10/23/2023</a:t>
+              <a:t>10/27/2023</a:t>
             </a:fld>
             <a:endParaRPr lang="en-US"/>
           </a:p>
@@ -1630,7 +1819,7 @@
           <a:p>
             <a:fld id="{EA307E68-3151-4021-8034-6905DEC8B993}" type="datetimeFigureOut">
               <a:rPr lang="en-US" smtClean="0"/>
-              <a:t>10/23/2023</a:t>
+              <a:t>10/27/2023</a:t>
             </a:fld>
             <a:endParaRPr lang="en-US"/>
           </a:p>
@@ -1748,7 +1937,7 @@
           <a:p>
             <a:fld id="{EA307E68-3151-4021-8034-6905DEC8B993}" type="datetimeFigureOut">
               <a:rPr lang="en-US" smtClean="0"/>
-              <a:t>10/23/2023</a:t>
+              <a:t>10/27/2023</a:t>
             </a:fld>
             <a:endParaRPr lang="en-US"/>
           </a:p>
@@ -1843,7 +2032,7 @@
           <a:p>
             <a:fld id="{EA307E68-3151-4021-8034-6905DEC8B993}" type="datetimeFigureOut">
               <a:rPr lang="en-US" smtClean="0"/>
-              <a:t>10/23/2023</a:t>
+              <a:t>10/27/2023</a:t>
             </a:fld>
             <a:endParaRPr lang="en-US"/>
           </a:p>
@@ -2120,7 +2309,7 @@
           <a:p>
             <a:fld id="{EA307E68-3151-4021-8034-6905DEC8B993}" type="datetimeFigureOut">
               <a:rPr lang="en-US" smtClean="0"/>
-              <a:t>10/23/2023</a:t>
+              <a:t>10/27/2023</a:t>
             </a:fld>
             <a:endParaRPr lang="en-US"/>
           </a:p>
@@ -2377,7 +2566,7 @@
           <a:p>
             <a:fld id="{EA307E68-3151-4021-8034-6905DEC8B993}" type="datetimeFigureOut">
               <a:rPr lang="en-US" smtClean="0"/>
-              <a:t>10/23/2023</a:t>
+              <a:t>10/27/2023</a:t>
             </a:fld>
             <a:endParaRPr lang="en-US"/>
           </a:p>
@@ -2590,7 +2779,7 @@
           <a:p>
             <a:fld id="{EA307E68-3151-4021-8034-6905DEC8B993}" type="datetimeFigureOut">
               <a:rPr lang="en-US" smtClean="0"/>
-              <a:t>10/23/2023</a:t>
+              <a:t>10/27/2023</a:t>
             </a:fld>
             <a:endParaRPr lang="en-US"/>
           </a:p>
@@ -3257,10 +3446,573 @@
           </a:fontRef>
         </p:style>
       </p:cxnSp>
+      <p:pic>
+        <p:nvPicPr>
+          <p:cNvPr id="7" name="Picture 6">
+            <a:extLst>
+              <a:ext uri="{FF2B5EF4-FFF2-40B4-BE49-F238E27FC236}">
+                <a16:creationId xmlns:a16="http://schemas.microsoft.com/office/drawing/2014/main" id="{BD8D348B-9B09-85F0-598C-37F5739B0C29}"/>
+              </a:ext>
+            </a:extLst>
+          </p:cNvPr>
+          <p:cNvPicPr>
+            <a:picLocks noChangeAspect="1"/>
+          </p:cNvPicPr>
+          <p:nvPr/>
+        </p:nvPicPr>
+        <p:blipFill>
+          <a:blip r:embed="rId5">
+            <a:extLst>
+              <a:ext uri="{28A0092B-C50C-407E-A947-70E740481C1C}">
+                <a14:useLocalDpi xmlns:a14="http://schemas.microsoft.com/office/drawing/2010/main" val="0"/>
+              </a:ext>
+            </a:extLst>
+          </a:blip>
+          <a:stretch>
+            <a:fillRect/>
+          </a:stretch>
+        </p:blipFill>
+        <p:spPr>
+          <a:xfrm>
+            <a:off x="835773" y="1219200"/>
+            <a:ext cx="4866667" cy="4400000"/>
+          </a:xfrm>
+          <a:prstGeom prst="rect">
+            <a:avLst/>
+          </a:prstGeom>
+        </p:spPr>
+      </p:pic>
     </p:spTree>
     <p:extLst>
       <p:ext uri="{BB962C8B-B14F-4D97-AF65-F5344CB8AC3E}">
         <p14:creationId xmlns:p14="http://schemas.microsoft.com/office/powerpoint/2010/main" val="2429365050"/>
+      </p:ext>
+    </p:extLst>
+  </p:cSld>
+  <p:clrMapOvr>
+    <a:masterClrMapping/>
+  </p:clrMapOvr>
+</p:sld>
+</file>
+
+<file path=ppt/slides/slide2.xml><?xml version="1.0" encoding="utf-8"?>
+<p:sld xmlns:a="http://schemas.openxmlformats.org/drawingml/2006/main" xmlns:r="http://schemas.openxmlformats.org/officeDocument/2006/relationships" xmlns:p="http://schemas.openxmlformats.org/presentationml/2006/main">
+  <p:cSld>
+    <p:spTree>
+      <p:nvGrpSpPr>
+        <p:cNvPr id="1" name=""/>
+        <p:cNvGrpSpPr/>
+        <p:nvPr/>
+      </p:nvGrpSpPr>
+      <p:grpSpPr>
+        <a:xfrm>
+          <a:off x="0" y="0"/>
+          <a:ext cx="0" cy="0"/>
+          <a:chOff x="0" y="0"/>
+          <a:chExt cx="0" cy="0"/>
+        </a:xfrm>
+      </p:grpSpPr>
+      <p:sp>
+        <p:nvSpPr>
+          <p:cNvPr id="4" name="TextBox 3">
+            <a:extLst>
+              <a:ext uri="{FF2B5EF4-FFF2-40B4-BE49-F238E27FC236}">
+                <a16:creationId xmlns:a16="http://schemas.microsoft.com/office/drawing/2014/main" id="{F219D5B5-8811-99AF-432E-5B6809E53C89}"/>
+              </a:ext>
+            </a:extLst>
+          </p:cNvPr>
+          <p:cNvSpPr txBox="1"/>
+          <p:nvPr/>
+        </p:nvSpPr>
+        <p:spPr>
+          <a:xfrm>
+            <a:off x="1942140" y="3266650"/>
+            <a:ext cx="1570623" cy="400110"/>
+          </a:xfrm>
+          <a:prstGeom prst="rect">
+            <a:avLst/>
+          </a:prstGeom>
+          <a:noFill/>
+        </p:spPr>
+        <p:txBody>
+          <a:bodyPr wrap="none" rtlCol="0">
+            <a:spAutoFit/>
+          </a:bodyPr>
+          <a:lstStyle/>
+          <a:p>
+            <a:r>
+              <a:rPr lang="en-US" sz="2000" b="1" dirty="0"/>
+              <a:t>Loki Goodcat</a:t>
+            </a:r>
+          </a:p>
+        </p:txBody>
+      </p:sp>
+      <p:pic>
+        <p:nvPicPr>
+          <p:cNvPr id="6" name="Picture 5">
+            <a:extLst>
+              <a:ext uri="{FF2B5EF4-FFF2-40B4-BE49-F238E27FC236}">
+                <a16:creationId xmlns:a16="http://schemas.microsoft.com/office/drawing/2014/main" id="{EC35F343-EBB2-402B-5A4B-F8284FF1B895}"/>
+              </a:ext>
+            </a:extLst>
+          </p:cNvPr>
+          <p:cNvPicPr>
+            <a:picLocks noChangeAspect="1"/>
+          </p:cNvPicPr>
+          <p:nvPr/>
+        </p:nvPicPr>
+        <p:blipFill>
+          <a:blip r:embed="rId2">
+            <a:extLst>
+              <a:ext uri="{28A0092B-C50C-407E-A947-70E740481C1C}">
+                <a14:useLocalDpi xmlns:a14="http://schemas.microsoft.com/office/drawing/2010/main" val="0"/>
+              </a:ext>
+            </a:extLst>
+          </a:blip>
+          <a:stretch>
+            <a:fillRect/>
+          </a:stretch>
+        </p:blipFill>
+        <p:spPr>
+          <a:xfrm>
+            <a:off x="1317547" y="48301"/>
+            <a:ext cx="4222906" cy="3145595"/>
+          </a:xfrm>
+          <a:prstGeom prst="rect">
+            <a:avLst/>
+          </a:prstGeom>
+        </p:spPr>
+      </p:pic>
+      <p:pic>
+        <p:nvPicPr>
+          <p:cNvPr id="8" name="Picture 7">
+            <a:extLst>
+              <a:ext uri="{FF2B5EF4-FFF2-40B4-BE49-F238E27FC236}">
+                <a16:creationId xmlns:a16="http://schemas.microsoft.com/office/drawing/2014/main" id="{27622E98-60DB-D4A1-0902-FA2B65448455}"/>
+              </a:ext>
+            </a:extLst>
+          </p:cNvPr>
+          <p:cNvPicPr>
+            <a:picLocks noChangeAspect="1"/>
+          </p:cNvPicPr>
+          <p:nvPr/>
+        </p:nvPicPr>
+        <p:blipFill>
+          <a:blip r:embed="rId3">
+            <a:extLst>
+              <a:ext uri="{28A0092B-C50C-407E-A947-70E740481C1C}">
+                <a14:useLocalDpi xmlns:a14="http://schemas.microsoft.com/office/drawing/2010/main" val="0"/>
+              </a:ext>
+            </a:extLst>
+          </a:blip>
+          <a:stretch>
+            <a:fillRect/>
+          </a:stretch>
+        </p:blipFill>
+        <p:spPr>
+          <a:xfrm>
+            <a:off x="1317547" y="7647187"/>
+            <a:ext cx="4222906" cy="1381359"/>
+          </a:xfrm>
+          <a:prstGeom prst="rect">
+            <a:avLst/>
+          </a:prstGeom>
+        </p:spPr>
+      </p:pic>
+      <p:pic>
+        <p:nvPicPr>
+          <p:cNvPr id="13" name="Picture 12">
+            <a:extLst>
+              <a:ext uri="{FF2B5EF4-FFF2-40B4-BE49-F238E27FC236}">
+                <a16:creationId xmlns:a16="http://schemas.microsoft.com/office/drawing/2014/main" id="{D79BC184-8F5F-1D5D-347B-F1E551AC7D68}"/>
+              </a:ext>
+            </a:extLst>
+          </p:cNvPr>
+          <p:cNvPicPr>
+            <a:picLocks noChangeAspect="1"/>
+          </p:cNvPicPr>
+          <p:nvPr/>
+        </p:nvPicPr>
+        <p:blipFill>
+          <a:blip r:embed="rId4">
+            <a:extLst>
+              <a:ext uri="{28A0092B-C50C-407E-A947-70E740481C1C}">
+                <a14:useLocalDpi xmlns:a14="http://schemas.microsoft.com/office/drawing/2010/main" val="0"/>
+              </a:ext>
+            </a:extLst>
+          </a:blip>
+          <a:stretch>
+            <a:fillRect/>
+          </a:stretch>
+        </p:blipFill>
+        <p:spPr>
+          <a:xfrm>
+            <a:off x="1317547" y="3943222"/>
+            <a:ext cx="4222906" cy="4091527"/>
+          </a:xfrm>
+          <a:prstGeom prst="rect">
+            <a:avLst/>
+          </a:prstGeom>
+        </p:spPr>
+      </p:pic>
+      <p:pic>
+        <p:nvPicPr>
+          <p:cNvPr id="15" name="Picture 14">
+            <a:extLst>
+              <a:ext uri="{FF2B5EF4-FFF2-40B4-BE49-F238E27FC236}">
+                <a16:creationId xmlns:a16="http://schemas.microsoft.com/office/drawing/2014/main" id="{A0626C39-C368-E88E-863E-FFBD07231980}"/>
+              </a:ext>
+            </a:extLst>
+          </p:cNvPr>
+          <p:cNvPicPr>
+            <a:picLocks noChangeAspect="1"/>
+          </p:cNvPicPr>
+          <p:nvPr/>
+        </p:nvPicPr>
+        <p:blipFill>
+          <a:blip r:embed="rId5"/>
+          <a:stretch>
+            <a:fillRect/>
+          </a:stretch>
+        </p:blipFill>
+        <p:spPr>
+          <a:xfrm>
+            <a:off x="1513569" y="3226458"/>
+            <a:ext cx="428571" cy="409524"/>
+          </a:xfrm>
+          <a:prstGeom prst="rect">
+            <a:avLst/>
+          </a:prstGeom>
+        </p:spPr>
+      </p:pic>
+      <p:sp>
+        <p:nvSpPr>
+          <p:cNvPr id="16" name="TextBox 15">
+            <a:extLst>
+              <a:ext uri="{FF2B5EF4-FFF2-40B4-BE49-F238E27FC236}">
+                <a16:creationId xmlns:a16="http://schemas.microsoft.com/office/drawing/2014/main" id="{A0196CB8-430D-1EAC-BA7F-15D670F1FCA0}"/>
+              </a:ext>
+            </a:extLst>
+          </p:cNvPr>
+          <p:cNvSpPr txBox="1"/>
+          <p:nvPr/>
+        </p:nvSpPr>
+        <p:spPr>
+          <a:xfrm>
+            <a:off x="1942140" y="3538721"/>
+            <a:ext cx="1898212" cy="400110"/>
+          </a:xfrm>
+          <a:prstGeom prst="rect">
+            <a:avLst/>
+          </a:prstGeom>
+          <a:noFill/>
+        </p:spPr>
+        <p:txBody>
+          <a:bodyPr wrap="none" rtlCol="0">
+            <a:spAutoFit/>
+          </a:bodyPr>
+          <a:lstStyle/>
+          <a:p>
+            <a:r>
+              <a:rPr lang="en-US" sz="2000" dirty="0">
+                <a:solidFill>
+                  <a:schemeClr val="bg1">
+                    <a:lumMod val="50000"/>
+                  </a:schemeClr>
+                </a:solidFill>
+              </a:rPr>
+              <a:t>Seattle, WA . 6h </a:t>
+            </a:r>
+          </a:p>
+        </p:txBody>
+      </p:sp>
+      <p:pic>
+        <p:nvPicPr>
+          <p:cNvPr id="18" name="Picture 17">
+            <a:extLst>
+              <a:ext uri="{FF2B5EF4-FFF2-40B4-BE49-F238E27FC236}">
+                <a16:creationId xmlns:a16="http://schemas.microsoft.com/office/drawing/2014/main" id="{D1164090-9041-6189-18F9-E26EA055CD7F}"/>
+              </a:ext>
+            </a:extLst>
+          </p:cNvPr>
+          <p:cNvPicPr>
+            <a:picLocks noChangeAspect="1"/>
+          </p:cNvPicPr>
+          <p:nvPr/>
+        </p:nvPicPr>
+        <p:blipFill>
+          <a:blip r:embed="rId6"/>
+          <a:stretch>
+            <a:fillRect/>
+          </a:stretch>
+        </p:blipFill>
+        <p:spPr>
+          <a:xfrm>
+            <a:off x="3764599" y="3627978"/>
+            <a:ext cx="209524" cy="219048"/>
+          </a:xfrm>
+          <a:prstGeom prst="rect">
+            <a:avLst/>
+          </a:prstGeom>
+        </p:spPr>
+      </p:pic>
+      <p:sp>
+        <p:nvSpPr>
+          <p:cNvPr id="19" name="TextBox 18">
+            <a:extLst>
+              <a:ext uri="{FF2B5EF4-FFF2-40B4-BE49-F238E27FC236}">
+                <a16:creationId xmlns:a16="http://schemas.microsoft.com/office/drawing/2014/main" id="{8A069E48-CC44-9E08-4B2C-14E8D2FFA428}"/>
+              </a:ext>
+            </a:extLst>
+          </p:cNvPr>
+          <p:cNvSpPr txBox="1"/>
+          <p:nvPr/>
+        </p:nvSpPr>
+        <p:spPr>
+          <a:xfrm>
+            <a:off x="5442942" y="1715002"/>
+            <a:ext cx="874959" cy="923330"/>
+          </a:xfrm>
+          <a:prstGeom prst="rect">
+            <a:avLst/>
+          </a:prstGeom>
+          <a:noFill/>
+        </p:spPr>
+        <p:txBody>
+          <a:bodyPr wrap="square" rtlCol="0">
+            <a:spAutoFit/>
+          </a:bodyPr>
+          <a:lstStyle/>
+          <a:p>
+            <a:pPr algn="ctr"/>
+            <a:r>
+              <a:rPr lang="en-US" b="1" dirty="0">
+                <a:solidFill>
+                  <a:schemeClr val="accent1"/>
+                </a:solidFill>
+              </a:rPr>
+              <a:t>Don’t click here</a:t>
+            </a:r>
+          </a:p>
+        </p:txBody>
+      </p:sp>
+      <p:cxnSp>
+        <p:nvCxnSpPr>
+          <p:cNvPr id="20" name="Straight Connector 19">
+            <a:extLst>
+              <a:ext uri="{FF2B5EF4-FFF2-40B4-BE49-F238E27FC236}">
+                <a16:creationId xmlns:a16="http://schemas.microsoft.com/office/drawing/2014/main" id="{BF107E5E-13FC-A8EF-A646-94047B4BCF46}"/>
+              </a:ext>
+            </a:extLst>
+          </p:cNvPr>
+          <p:cNvCxnSpPr>
+            <a:cxnSpLocks/>
+          </p:cNvCxnSpPr>
+          <p:nvPr/>
+        </p:nvCxnSpPr>
+        <p:spPr>
+          <a:xfrm flipH="1">
+            <a:off x="5310429" y="2246053"/>
+            <a:ext cx="335531" cy="230559"/>
+          </a:xfrm>
+          <a:prstGeom prst="line">
+            <a:avLst/>
+          </a:prstGeom>
+          <a:ln w="28575"/>
+        </p:spPr>
+        <p:style>
+          <a:lnRef idx="1">
+            <a:schemeClr val="accent1"/>
+          </a:lnRef>
+          <a:fillRef idx="0">
+            <a:schemeClr val="accent1"/>
+          </a:fillRef>
+          <a:effectRef idx="0">
+            <a:schemeClr val="accent1"/>
+          </a:effectRef>
+          <a:fontRef idx="minor">
+            <a:schemeClr val="tx1"/>
+          </a:fontRef>
+        </p:style>
+      </p:cxnSp>
+      <p:sp>
+        <p:nvSpPr>
+          <p:cNvPr id="25" name="Rectangle: Rounded Corners 24">
+            <a:extLst>
+              <a:ext uri="{FF2B5EF4-FFF2-40B4-BE49-F238E27FC236}">
+                <a16:creationId xmlns:a16="http://schemas.microsoft.com/office/drawing/2014/main" id="{505E09E8-2DB6-13EB-A3E4-C6D73A6060B6}"/>
+              </a:ext>
+            </a:extLst>
+          </p:cNvPr>
+          <p:cNvSpPr/>
+          <p:nvPr/>
+        </p:nvSpPr>
+        <p:spPr>
+          <a:xfrm>
+            <a:off x="1280475" y="3160080"/>
+            <a:ext cx="4328413" cy="4755657"/>
+          </a:xfrm>
+          <a:prstGeom prst="roundRect">
+            <a:avLst>
+              <a:gd name="adj" fmla="val 10690"/>
+            </a:avLst>
+          </a:prstGeom>
+          <a:solidFill>
+            <a:schemeClr val="bg2">
+              <a:lumMod val="90000"/>
+              <a:alpha val="76000"/>
+            </a:schemeClr>
+          </a:solidFill>
+          <a:ln>
+            <a:noFill/>
+          </a:ln>
+        </p:spPr>
+        <p:style>
+          <a:lnRef idx="2">
+            <a:schemeClr val="accent1">
+              <a:shade val="15000"/>
+            </a:schemeClr>
+          </a:lnRef>
+          <a:fillRef idx="1">
+            <a:schemeClr val="accent1"/>
+          </a:fillRef>
+          <a:effectRef idx="0">
+            <a:schemeClr val="accent1"/>
+          </a:effectRef>
+          <a:fontRef idx="minor">
+            <a:schemeClr val="lt1"/>
+          </a:fontRef>
+        </p:style>
+        <p:txBody>
+          <a:bodyPr rtlCol="0" anchor="ctr"/>
+          <a:lstStyle/>
+          <a:p>
+            <a:pPr algn="ctr"/>
+            <a:endParaRPr lang="en-US"/>
+          </a:p>
+        </p:txBody>
+      </p:sp>
+      <p:sp>
+        <p:nvSpPr>
+          <p:cNvPr id="22" name="TextBox 21">
+            <a:extLst>
+              <a:ext uri="{FF2B5EF4-FFF2-40B4-BE49-F238E27FC236}">
+                <a16:creationId xmlns:a16="http://schemas.microsoft.com/office/drawing/2014/main" id="{4EDC5607-476E-1575-78D8-64DE3FA82D0C}"/>
+              </a:ext>
+            </a:extLst>
+          </p:cNvPr>
+          <p:cNvSpPr txBox="1"/>
+          <p:nvPr/>
+        </p:nvSpPr>
+        <p:spPr>
+          <a:xfrm>
+            <a:off x="5330386" y="6960937"/>
+            <a:ext cx="644935" cy="553998"/>
+          </a:xfrm>
+          <a:prstGeom prst="rect">
+            <a:avLst/>
+          </a:prstGeom>
+          <a:solidFill>
+            <a:schemeClr val="bg1"/>
+          </a:solidFill>
+        </p:spPr>
+        <p:txBody>
+          <a:bodyPr wrap="square" lIns="0" tIns="0" rIns="0" bIns="0" rtlCol="0">
+            <a:spAutoFit/>
+          </a:bodyPr>
+          <a:lstStyle/>
+          <a:p>
+            <a:pPr algn="ctr"/>
+            <a:r>
+              <a:rPr lang="en-US" b="1" dirty="0">
+                <a:solidFill>
+                  <a:schemeClr val="accent1"/>
+                </a:solidFill>
+              </a:rPr>
+              <a:t>Click here</a:t>
+            </a:r>
+          </a:p>
+        </p:txBody>
+      </p:sp>
+      <p:cxnSp>
+        <p:nvCxnSpPr>
+          <p:cNvPr id="23" name="Straight Connector 22">
+            <a:extLst>
+              <a:ext uri="{FF2B5EF4-FFF2-40B4-BE49-F238E27FC236}">
+                <a16:creationId xmlns:a16="http://schemas.microsoft.com/office/drawing/2014/main" id="{9CEEA6AF-3B91-9FBD-559E-8923C98A58EA}"/>
+              </a:ext>
+            </a:extLst>
+          </p:cNvPr>
+          <p:cNvCxnSpPr>
+            <a:cxnSpLocks/>
+          </p:cNvCxnSpPr>
+          <p:nvPr/>
+        </p:nvCxnSpPr>
+        <p:spPr>
+          <a:xfrm flipH="1">
+            <a:off x="3649224" y="7428998"/>
+            <a:ext cx="1681162" cy="717298"/>
+          </a:xfrm>
+          <a:prstGeom prst="line">
+            <a:avLst/>
+          </a:prstGeom>
+          <a:ln w="28575"/>
+        </p:spPr>
+        <p:style>
+          <a:lnRef idx="1">
+            <a:schemeClr val="accent1"/>
+          </a:lnRef>
+          <a:fillRef idx="0">
+            <a:schemeClr val="accent1"/>
+          </a:fillRef>
+          <a:effectRef idx="0">
+            <a:schemeClr val="accent1"/>
+          </a:effectRef>
+          <a:fontRef idx="minor">
+            <a:schemeClr val="tx1"/>
+          </a:fontRef>
+        </p:style>
+      </p:cxnSp>
+      <p:pic>
+        <p:nvPicPr>
+          <p:cNvPr id="30" name="Picture 29">
+            <a:extLst>
+              <a:ext uri="{FF2B5EF4-FFF2-40B4-BE49-F238E27FC236}">
+                <a16:creationId xmlns:a16="http://schemas.microsoft.com/office/drawing/2014/main" id="{12E57019-AEBA-EA26-A80D-A1839AE2ABB2}"/>
+              </a:ext>
+            </a:extLst>
+          </p:cNvPr>
+          <p:cNvPicPr>
+            <a:picLocks noChangeAspect="1"/>
+          </p:cNvPicPr>
+          <p:nvPr/>
+        </p:nvPicPr>
+        <p:blipFill>
+          <a:blip r:embed="rId7">
+            <a:extLst>
+              <a:ext uri="{28A0092B-C50C-407E-A947-70E740481C1C}">
+                <a14:useLocalDpi xmlns:a14="http://schemas.microsoft.com/office/drawing/2010/main" val="0"/>
+              </a:ext>
+            </a:extLst>
+          </a:blip>
+          <a:stretch>
+            <a:fillRect/>
+          </a:stretch>
+        </p:blipFill>
+        <p:spPr>
+          <a:xfrm>
+            <a:off x="1215890" y="8852004"/>
+            <a:ext cx="4866667" cy="176542"/>
+          </a:xfrm>
+          <a:prstGeom prst="rect">
+            <a:avLst/>
+          </a:prstGeom>
+        </p:spPr>
+      </p:pic>
+    </p:spTree>
+    <p:extLst>
+      <p:ext uri="{BB962C8B-B14F-4D97-AF65-F5344CB8AC3E}">
+        <p14:creationId xmlns:p14="http://schemas.microsoft.com/office/powerpoint/2010/main" val="1926906025"/>
       </p:ext>
     </p:extLst>
   </p:cSld>

</xml_diff>

<commit_message>
Changes to the 'How to Post' page
</commit_message>
<xml_diff>
--- a/image/howToPost.pptx
+++ b/image/howToPost.pptx
@@ -118,16 +118,80 @@
   <pc:docChgLst>
     <pc:chgData name="George John" userId="1c7f5d7288d1a48b" providerId="LiveId" clId="{0144DF34-647E-4BF4-ABCB-FB17BAA507B1}"/>
     <pc:docChg chg="undo custSel addSld modSld">
-      <pc:chgData name="George John" userId="1c7f5d7288d1a48b" providerId="LiveId" clId="{0144DF34-647E-4BF4-ABCB-FB17BAA507B1}" dt="2023-10-28T06:01:37.553" v="693" actId="1076"/>
+      <pc:chgData name="George John" userId="1c7f5d7288d1a48b" providerId="LiveId" clId="{0144DF34-647E-4BF4-ABCB-FB17BAA507B1}" dt="2023-10-30T00:41:41.602" v="1260" actId="1076"/>
       <pc:docMkLst>
         <pc:docMk/>
       </pc:docMkLst>
       <pc:sldChg chg="addSp delSp modSp mod">
-        <pc:chgData name="George John" userId="1c7f5d7288d1a48b" providerId="LiveId" clId="{0144DF34-647E-4BF4-ABCB-FB17BAA507B1}" dt="2023-10-28T06:01:08.853" v="684" actId="1076"/>
+        <pc:chgData name="George John" userId="1c7f5d7288d1a48b" providerId="LiveId" clId="{0144DF34-647E-4BF4-ABCB-FB17BAA507B1}" dt="2023-10-30T00:41:41.602" v="1260" actId="1076"/>
         <pc:sldMkLst>
           <pc:docMk/>
           <pc:sldMk cId="2429365050" sldId="256"/>
         </pc:sldMkLst>
+        <pc:spChg chg="add mod ord">
+          <ac:chgData name="George John" userId="1c7f5d7288d1a48b" providerId="LiveId" clId="{0144DF34-647E-4BF4-ABCB-FB17BAA507B1}" dt="2023-10-30T00:41:22.697" v="1257" actId="1076"/>
+          <ac:spMkLst>
+            <pc:docMk/>
+            <pc:sldMk cId="2429365050" sldId="256"/>
+            <ac:spMk id="2" creationId="{8D618F7A-415B-3E5B-B839-9A1E37697057}"/>
+          </ac:spMkLst>
+        </pc:spChg>
+        <pc:spChg chg="add mod">
+          <ac:chgData name="George John" userId="1c7f5d7288d1a48b" providerId="LiveId" clId="{0144DF34-647E-4BF4-ABCB-FB17BAA507B1}" dt="2023-10-30T00:40:14.656" v="1247" actId="164"/>
+          <ac:spMkLst>
+            <pc:docMk/>
+            <pc:sldMk cId="2429365050" sldId="256"/>
+            <ac:spMk id="3" creationId="{15A83833-3350-0AE5-7A76-6357C1B48DF2}"/>
+          </ac:spMkLst>
+        </pc:spChg>
+        <pc:spChg chg="add mod">
+          <ac:chgData name="George John" userId="1c7f5d7288d1a48b" providerId="LiveId" clId="{0144DF34-647E-4BF4-ABCB-FB17BAA507B1}" dt="2023-10-30T00:40:14.656" v="1247" actId="164"/>
+          <ac:spMkLst>
+            <pc:docMk/>
+            <pc:sldMk cId="2429365050" sldId="256"/>
+            <ac:spMk id="4" creationId="{B4C1F2D1-C183-05EA-A130-1BA626B50822}"/>
+          </ac:spMkLst>
+        </pc:spChg>
+        <pc:spChg chg="add mod">
+          <ac:chgData name="George John" userId="1c7f5d7288d1a48b" providerId="LiveId" clId="{0144DF34-647E-4BF4-ABCB-FB17BAA507B1}" dt="2023-10-30T00:40:14.656" v="1247" actId="164"/>
+          <ac:spMkLst>
+            <pc:docMk/>
+            <pc:sldMk cId="2429365050" sldId="256"/>
+            <ac:spMk id="5" creationId="{6A4D6D54-257D-8402-7A79-E36C201BE877}"/>
+          </ac:spMkLst>
+        </pc:spChg>
+        <pc:spChg chg="mod">
+          <ac:chgData name="George John" userId="1c7f5d7288d1a48b" providerId="LiveId" clId="{0144DF34-647E-4BF4-ABCB-FB17BAA507B1}" dt="2023-10-30T00:40:14.656" v="1247" actId="164"/>
+          <ac:spMkLst>
+            <pc:docMk/>
+            <pc:sldMk cId="2429365050" sldId="256"/>
+            <ac:spMk id="16" creationId="{7FFE27DD-6947-F70A-917B-26A58299303D}"/>
+          </ac:spMkLst>
+        </pc:spChg>
+        <pc:spChg chg="mod">
+          <ac:chgData name="George John" userId="1c7f5d7288d1a48b" providerId="LiveId" clId="{0144DF34-647E-4BF4-ABCB-FB17BAA507B1}" dt="2023-10-30T00:40:14.656" v="1247" actId="164"/>
+          <ac:spMkLst>
+            <pc:docMk/>
+            <pc:sldMk cId="2429365050" sldId="256"/>
+            <ac:spMk id="17" creationId="{FDA87858-ED50-B542-5CEA-D7A03A25CD80}"/>
+          </ac:spMkLst>
+        </pc:spChg>
+        <pc:spChg chg="add mod">
+          <ac:chgData name="George John" userId="1c7f5d7288d1a48b" providerId="LiveId" clId="{0144DF34-647E-4BF4-ABCB-FB17BAA507B1}" dt="2023-10-30T00:41:41.602" v="1260" actId="1076"/>
+          <ac:spMkLst>
+            <pc:docMk/>
+            <pc:sldMk cId="2429365050" sldId="256"/>
+            <ac:spMk id="18" creationId="{46136DFE-F0D8-A090-1377-C788132E89A2}"/>
+          </ac:spMkLst>
+        </pc:spChg>
+        <pc:grpChg chg="add mod">
+          <ac:chgData name="George John" userId="1c7f5d7288d1a48b" providerId="LiveId" clId="{0144DF34-647E-4BF4-ABCB-FB17BAA507B1}" dt="2023-10-30T00:40:14.656" v="1247" actId="164"/>
+          <ac:grpSpMkLst>
+            <pc:docMk/>
+            <pc:sldMk cId="2429365050" sldId="256"/>
+            <ac:grpSpMk id="6" creationId="{87798A15-81C8-2DD8-7DC5-90FD6EEB0345}"/>
+          </ac:grpSpMkLst>
+        </pc:grpChg>
         <pc:picChg chg="add del mod">
           <ac:chgData name="George John" userId="1c7f5d7288d1a48b" providerId="LiveId" clId="{0144DF34-647E-4BF4-ABCB-FB17BAA507B1}" dt="2023-10-28T05:07:25.497" v="2" actId="21"/>
           <ac:picMkLst>
@@ -153,11 +217,27 @@
           </ac:picMkLst>
         </pc:picChg>
         <pc:picChg chg="add mod">
-          <ac:chgData name="George John" userId="1c7f5d7288d1a48b" providerId="LiveId" clId="{0144DF34-647E-4BF4-ABCB-FB17BAA507B1}" dt="2023-10-28T06:01:08.853" v="684" actId="1076"/>
+          <ac:chgData name="George John" userId="1c7f5d7288d1a48b" providerId="LiveId" clId="{0144DF34-647E-4BF4-ABCB-FB17BAA507B1}" dt="2023-10-30T00:40:14.656" v="1247" actId="164"/>
           <ac:picMkLst>
             <pc:docMk/>
             <pc:sldMk cId="2429365050" sldId="256"/>
             <ac:picMk id="7" creationId="{BD8D348B-9B09-85F0-598C-37F5739B0C29}"/>
+          </ac:picMkLst>
+        </pc:picChg>
+        <pc:picChg chg="mod">
+          <ac:chgData name="George John" userId="1c7f5d7288d1a48b" providerId="LiveId" clId="{0144DF34-647E-4BF4-ABCB-FB17BAA507B1}" dt="2023-10-30T00:40:14.656" v="1247" actId="164"/>
+          <ac:picMkLst>
+            <pc:docMk/>
+            <pc:sldMk cId="2429365050" sldId="256"/>
+            <ac:picMk id="9" creationId="{B5B8D332-926C-C7BA-9B83-B538091B55F6}"/>
+          </ac:picMkLst>
+        </pc:picChg>
+        <pc:picChg chg="mod">
+          <ac:chgData name="George John" userId="1c7f5d7288d1a48b" providerId="LiveId" clId="{0144DF34-647E-4BF4-ABCB-FB17BAA507B1}" dt="2023-10-30T00:40:14.656" v="1247" actId="164"/>
+          <ac:picMkLst>
+            <pc:docMk/>
+            <pc:sldMk cId="2429365050" sldId="256"/>
+            <ac:picMk id="11" creationId="{E362918E-6954-3B1B-DF77-B655EA6C452E}"/>
           </ac:picMkLst>
         </pc:picChg>
         <pc:picChg chg="del">
@@ -168,19 +248,75 @@
             <ac:picMk id="13" creationId="{B2F09005-9A78-98C8-91D3-39145B4F0441}"/>
           </ac:picMkLst>
         </pc:picChg>
+        <pc:picChg chg="mod">
+          <ac:chgData name="George John" userId="1c7f5d7288d1a48b" providerId="LiveId" clId="{0144DF34-647E-4BF4-ABCB-FB17BAA507B1}" dt="2023-10-30T00:40:14.656" v="1247" actId="164"/>
+          <ac:picMkLst>
+            <pc:docMk/>
+            <pc:sldMk cId="2429365050" sldId="256"/>
+            <ac:picMk id="15" creationId="{6F9F2A86-D911-18F5-691D-899F6EA47EBA}"/>
+          </ac:picMkLst>
+        </pc:picChg>
+        <pc:cxnChg chg="add mod">
+          <ac:chgData name="George John" userId="1c7f5d7288d1a48b" providerId="LiveId" clId="{0144DF34-647E-4BF4-ABCB-FB17BAA507B1}" dt="2023-10-30T00:41:26.664" v="1258" actId="14100"/>
+          <ac:cxnSpMkLst>
+            <pc:docMk/>
+            <pc:sldMk cId="2429365050" sldId="256"/>
+            <ac:cxnSpMk id="8" creationId="{7DCD4D0C-0EC4-E287-17B2-6FBDCB0497D6}"/>
+          </ac:cxnSpMkLst>
+        </pc:cxnChg>
+        <pc:cxnChg chg="mod">
+          <ac:chgData name="George John" userId="1c7f5d7288d1a48b" providerId="LiveId" clId="{0144DF34-647E-4BF4-ABCB-FB17BAA507B1}" dt="2023-10-30T00:40:14.656" v="1247" actId="164"/>
+          <ac:cxnSpMkLst>
+            <pc:docMk/>
+            <pc:sldMk cId="2429365050" sldId="256"/>
+            <ac:cxnSpMk id="19" creationId="{C6D52313-B39E-ED70-00B0-38EA885C93A1}"/>
+          </ac:cxnSpMkLst>
+        </pc:cxnChg>
+        <pc:cxnChg chg="mod">
+          <ac:chgData name="George John" userId="1c7f5d7288d1a48b" providerId="LiveId" clId="{0144DF34-647E-4BF4-ABCB-FB17BAA507B1}" dt="2023-10-30T00:40:14.656" v="1247" actId="164"/>
+          <ac:cxnSpMkLst>
+            <pc:docMk/>
+            <pc:sldMk cId="2429365050" sldId="256"/>
+            <ac:cxnSpMk id="20" creationId="{59FA40A0-43B2-7927-5632-154E835C24EA}"/>
+          </ac:cxnSpMkLst>
+        </pc:cxnChg>
+        <pc:cxnChg chg="add mod">
+          <ac:chgData name="George John" userId="1c7f5d7288d1a48b" providerId="LiveId" clId="{0144DF34-647E-4BF4-ABCB-FB17BAA507B1}" dt="2023-10-30T00:41:41.602" v="1260" actId="1076"/>
+          <ac:cxnSpMkLst>
+            <pc:docMk/>
+            <pc:sldMk cId="2429365050" sldId="256"/>
+            <ac:cxnSpMk id="21" creationId="{DF0CEFC7-9938-DC5D-7D42-71CA2323D1B0}"/>
+          </ac:cxnSpMkLst>
+        </pc:cxnChg>
       </pc:sldChg>
       <pc:sldChg chg="addSp delSp modSp new mod">
-        <pc:chgData name="George John" userId="1c7f5d7288d1a48b" providerId="LiveId" clId="{0144DF34-647E-4BF4-ABCB-FB17BAA507B1}" dt="2023-10-28T06:01:37.553" v="693" actId="1076"/>
+        <pc:chgData name="George John" userId="1c7f5d7288d1a48b" providerId="LiveId" clId="{0144DF34-647E-4BF4-ABCB-FB17BAA507B1}" dt="2023-10-30T00:12:36.140" v="1205" actId="14100"/>
         <pc:sldMkLst>
           <pc:docMk/>
           <pc:sldMk cId="1926906025" sldId="257"/>
         </pc:sldMkLst>
+        <pc:spChg chg="add del mod ord">
+          <ac:chgData name="George John" userId="1c7f5d7288d1a48b" providerId="LiveId" clId="{0144DF34-647E-4BF4-ABCB-FB17BAA507B1}" dt="2023-10-30T00:11:02.444" v="1200" actId="478"/>
+          <ac:spMkLst>
+            <pc:docMk/>
+            <pc:sldMk cId="1926906025" sldId="257"/>
+            <ac:spMk id="2" creationId="{769AAB3C-1D44-1806-19DF-FA924A40114B}"/>
+          </ac:spMkLst>
+        </pc:spChg>
         <pc:spChg chg="add mod">
           <ac:chgData name="George John" userId="1c7f5d7288d1a48b" providerId="LiveId" clId="{0144DF34-647E-4BF4-ABCB-FB17BAA507B1}" dt="2023-10-28T05:52:23.219" v="531" actId="1036"/>
           <ac:spMkLst>
             <pc:docMk/>
             <pc:sldMk cId="1926906025" sldId="257"/>
             <ac:spMk id="4" creationId="{F219D5B5-8811-99AF-432E-5B6809E53C89}"/>
+          </ac:spMkLst>
+        </pc:spChg>
+        <pc:spChg chg="add mod">
+          <ac:chgData name="George John" userId="1c7f5d7288d1a48b" providerId="LiveId" clId="{0144DF34-647E-4BF4-ABCB-FB17BAA507B1}" dt="2023-10-30T00:02:34.632" v="1096" actId="1035"/>
+          <ac:spMkLst>
+            <pc:docMk/>
+            <pc:sldMk cId="1926906025" sldId="257"/>
+            <ac:spMk id="7" creationId="{BD4DC219-D868-6115-C128-91F328A2E077}"/>
           </ac:spMkLst>
         </pc:spChg>
         <pc:spChg chg="add del mod">
@@ -192,6 +328,14 @@
           </ac:spMkLst>
         </pc:spChg>
         <pc:spChg chg="add mod">
+          <ac:chgData name="George John" userId="1c7f5d7288d1a48b" providerId="LiveId" clId="{0144DF34-647E-4BF4-ABCB-FB17BAA507B1}" dt="2023-10-29T23:59:39.258" v="1051" actId="20577"/>
+          <ac:spMkLst>
+            <pc:docMk/>
+            <pc:sldMk cId="1926906025" sldId="257"/>
+            <ac:spMk id="9" creationId="{E0FFCD8B-45B4-43BB-28EA-9E27A66680D2}"/>
+          </ac:spMkLst>
+        </pc:spChg>
+        <pc:spChg chg="add mod">
           <ac:chgData name="George John" userId="1c7f5d7288d1a48b" providerId="LiveId" clId="{0144DF34-647E-4BF4-ABCB-FB17BAA507B1}" dt="2023-10-28T05:52:23.219" v="531" actId="1036"/>
           <ac:spMkLst>
             <pc:docMk/>
@@ -200,7 +344,7 @@
           </ac:spMkLst>
         </pc:spChg>
         <pc:spChg chg="add mod">
-          <ac:chgData name="George John" userId="1c7f5d7288d1a48b" providerId="LiveId" clId="{0144DF34-647E-4BF4-ABCB-FB17BAA507B1}" dt="2023-10-28T05:52:23.219" v="531" actId="1036"/>
+          <ac:chgData name="George John" userId="1c7f5d7288d1a48b" providerId="LiveId" clId="{0144DF34-647E-4BF4-ABCB-FB17BAA507B1}" dt="2023-10-30T00:12:24.362" v="1204" actId="1076"/>
           <ac:spMkLst>
             <pc:docMk/>
             <pc:sldMk cId="1926906025" sldId="257"/>
@@ -208,11 +352,19 @@
           </ac:spMkLst>
         </pc:spChg>
         <pc:spChg chg="add mod ord">
-          <ac:chgData name="George John" userId="1c7f5d7288d1a48b" providerId="LiveId" clId="{0144DF34-647E-4BF4-ABCB-FB17BAA507B1}" dt="2023-10-28T05:57:09.818" v="677" actId="1036"/>
+          <ac:chgData name="George John" userId="1c7f5d7288d1a48b" providerId="LiveId" clId="{0144DF34-647E-4BF4-ABCB-FB17BAA507B1}" dt="2023-10-30T00:11:58.932" v="1202" actId="1076"/>
           <ac:spMkLst>
             <pc:docMk/>
             <pc:sldMk cId="1926906025" sldId="257"/>
             <ac:spMk id="22" creationId="{4EDC5607-476E-1575-78D8-64DE3FA82D0C}"/>
+          </ac:spMkLst>
+        </pc:spChg>
+        <pc:spChg chg="add mod">
+          <ac:chgData name="George John" userId="1c7f5d7288d1a48b" providerId="LiveId" clId="{0144DF34-647E-4BF4-ABCB-FB17BAA507B1}" dt="2023-10-30T00:10:59.695" v="1199" actId="1038"/>
+          <ac:spMkLst>
+            <pc:docMk/>
+            <pc:sldMk cId="1926906025" sldId="257"/>
+            <ac:spMk id="24" creationId="{090818EA-8152-473B-528B-B8BD0B3442C6}"/>
           </ac:spMkLst>
         </pc:spChg>
         <pc:spChg chg="add del mod">
@@ -224,7 +376,7 @@
           </ac:spMkLst>
         </pc:spChg>
         <pc:spChg chg="add mod">
-          <ac:chgData name="George John" userId="1c7f5d7288d1a48b" providerId="LiveId" clId="{0144DF34-647E-4BF4-ABCB-FB17BAA507B1}" dt="2023-10-28T05:55:01.616" v="632" actId="207"/>
+          <ac:chgData name="George John" userId="1c7f5d7288d1a48b" providerId="LiveId" clId="{0144DF34-647E-4BF4-ABCB-FB17BAA507B1}" dt="2023-10-29T23:58:35.834" v="1015" actId="14100"/>
           <ac:spMkLst>
             <pc:docMk/>
             <pc:sldMk cId="1926906025" sldId="257"/>
@@ -248,6 +400,14 @@
           </ac:picMkLst>
         </pc:picChg>
         <pc:picChg chg="add mod">
+          <ac:chgData name="George John" userId="1c7f5d7288d1a48b" providerId="LiveId" clId="{0144DF34-647E-4BF4-ABCB-FB17BAA507B1}" dt="2023-10-29T23:58:44.552" v="1033" actId="1036"/>
+          <ac:picMkLst>
+            <pc:docMk/>
+            <pc:sldMk cId="1926906025" sldId="257"/>
+            <ac:picMk id="5" creationId="{F5B540F1-9221-3895-8BC2-736903D9480F}"/>
+          </ac:picMkLst>
+        </pc:picChg>
+        <pc:picChg chg="add mod">
           <ac:chgData name="George John" userId="1c7f5d7288d1a48b" providerId="LiveId" clId="{0144DF34-647E-4BF4-ABCB-FB17BAA507B1}" dt="2023-10-28T05:52:23.219" v="531" actId="1036"/>
           <ac:picMkLst>
             <pc:docMk/>
@@ -255,8 +415,8 @@
             <ac:picMk id="6" creationId="{EC35F343-EBB2-402B-5A4B-F8284FF1B895}"/>
           </ac:picMkLst>
         </pc:picChg>
-        <pc:picChg chg="add mod">
-          <ac:chgData name="George John" userId="1c7f5d7288d1a48b" providerId="LiveId" clId="{0144DF34-647E-4BF4-ABCB-FB17BAA507B1}" dt="2023-10-28T05:52:23.219" v="531" actId="1036"/>
+        <pc:picChg chg="add del mod ord">
+          <ac:chgData name="George John" userId="1c7f5d7288d1a48b" providerId="LiveId" clId="{0144DF34-647E-4BF4-ABCB-FB17BAA507B1}" dt="2023-10-29T23:53:00.526" v="968" actId="478"/>
           <ac:picMkLst>
             <pc:docMk/>
             <pc:sldMk cId="1926906025" sldId="257"/>
@@ -272,7 +432,7 @@
           </ac:picMkLst>
         </pc:picChg>
         <pc:picChg chg="add mod">
-          <ac:chgData name="George John" userId="1c7f5d7288d1a48b" providerId="LiveId" clId="{0144DF34-647E-4BF4-ABCB-FB17BAA507B1}" dt="2023-10-28T05:52:23.219" v="531" actId="1036"/>
+          <ac:chgData name="George John" userId="1c7f5d7288d1a48b" providerId="LiveId" clId="{0144DF34-647E-4BF4-ABCB-FB17BAA507B1}" dt="2023-10-29T23:49:46.681" v="889" actId="14100"/>
           <ac:picMkLst>
             <pc:docMk/>
             <pc:sldMk cId="1926906025" sldId="257"/>
@@ -296,7 +456,7 @@
           </ac:picMkLst>
         </pc:picChg>
         <pc:picChg chg="add mod">
-          <ac:chgData name="George John" userId="1c7f5d7288d1a48b" providerId="LiveId" clId="{0144DF34-647E-4BF4-ABCB-FB17BAA507B1}" dt="2023-10-28T06:01:37.553" v="693" actId="1076"/>
+          <ac:chgData name="George John" userId="1c7f5d7288d1a48b" providerId="LiveId" clId="{0144DF34-647E-4BF4-ABCB-FB17BAA507B1}" dt="2023-10-29T23:59:17.739" v="1041" actId="1582"/>
           <ac:picMkLst>
             <pc:docMk/>
             <pc:sldMk cId="1926906025" sldId="257"/>
@@ -304,7 +464,7 @@
           </ac:picMkLst>
         </pc:picChg>
         <pc:cxnChg chg="add mod">
-          <ac:chgData name="George John" userId="1c7f5d7288d1a48b" providerId="LiveId" clId="{0144DF34-647E-4BF4-ABCB-FB17BAA507B1}" dt="2023-10-28T05:52:23.219" v="531" actId="1036"/>
+          <ac:chgData name="George John" userId="1c7f5d7288d1a48b" providerId="LiveId" clId="{0144DF34-647E-4BF4-ABCB-FB17BAA507B1}" dt="2023-10-30T00:12:36.140" v="1205" actId="14100"/>
           <ac:cxnSpMkLst>
             <pc:docMk/>
             <pc:sldMk cId="1926906025" sldId="257"/>
@@ -312,7 +472,7 @@
           </ac:cxnSpMkLst>
         </pc:cxnChg>
         <pc:cxnChg chg="add mod ord">
-          <ac:chgData name="George John" userId="1c7f5d7288d1a48b" providerId="LiveId" clId="{0144DF34-647E-4BF4-ABCB-FB17BAA507B1}" dt="2023-10-28T05:57:13.912" v="678" actId="14100"/>
+          <ac:chgData name="George John" userId="1c7f5d7288d1a48b" providerId="LiveId" clId="{0144DF34-647E-4BF4-ABCB-FB17BAA507B1}" dt="2023-10-30T00:12:08.312" v="1203" actId="166"/>
           <ac:cxnSpMkLst>
             <pc:docMk/>
             <pc:sldMk cId="1926906025" sldId="257"/>
@@ -456,7 +616,7 @@
           <a:p>
             <a:fld id="{EA307E68-3151-4021-8034-6905DEC8B993}" type="datetimeFigureOut">
               <a:rPr lang="en-US" smtClean="0"/>
-              <a:t>10/27/2023</a:t>
+              <a:t>10/29/2023</a:t>
             </a:fld>
             <a:endParaRPr lang="en-US"/>
           </a:p>
@@ -626,7 +786,7 @@
           <a:p>
             <a:fld id="{EA307E68-3151-4021-8034-6905DEC8B993}" type="datetimeFigureOut">
               <a:rPr lang="en-US" smtClean="0"/>
-              <a:t>10/27/2023</a:t>
+              <a:t>10/29/2023</a:t>
             </a:fld>
             <a:endParaRPr lang="en-US"/>
           </a:p>
@@ -806,7 +966,7 @@
           <a:p>
             <a:fld id="{EA307E68-3151-4021-8034-6905DEC8B993}" type="datetimeFigureOut">
               <a:rPr lang="en-US" smtClean="0"/>
-              <a:t>10/27/2023</a:t>
+              <a:t>10/29/2023</a:t>
             </a:fld>
             <a:endParaRPr lang="en-US"/>
           </a:p>
@@ -976,7 +1136,7 @@
           <a:p>
             <a:fld id="{EA307E68-3151-4021-8034-6905DEC8B993}" type="datetimeFigureOut">
               <a:rPr lang="en-US" smtClean="0"/>
-              <a:t>10/27/2023</a:t>
+              <a:t>10/29/2023</a:t>
             </a:fld>
             <a:endParaRPr lang="en-US"/>
           </a:p>
@@ -1220,7 +1380,7 @@
           <a:p>
             <a:fld id="{EA307E68-3151-4021-8034-6905DEC8B993}" type="datetimeFigureOut">
               <a:rPr lang="en-US" smtClean="0"/>
-              <a:t>10/27/2023</a:t>
+              <a:t>10/29/2023</a:t>
             </a:fld>
             <a:endParaRPr lang="en-US"/>
           </a:p>
@@ -1452,7 +1612,7 @@
           <a:p>
             <a:fld id="{EA307E68-3151-4021-8034-6905DEC8B993}" type="datetimeFigureOut">
               <a:rPr lang="en-US" smtClean="0"/>
-              <a:t>10/27/2023</a:t>
+              <a:t>10/29/2023</a:t>
             </a:fld>
             <a:endParaRPr lang="en-US"/>
           </a:p>
@@ -1819,7 +1979,7 @@
           <a:p>
             <a:fld id="{EA307E68-3151-4021-8034-6905DEC8B993}" type="datetimeFigureOut">
               <a:rPr lang="en-US" smtClean="0"/>
-              <a:t>10/27/2023</a:t>
+              <a:t>10/29/2023</a:t>
             </a:fld>
             <a:endParaRPr lang="en-US"/>
           </a:p>
@@ -1937,7 +2097,7 @@
           <a:p>
             <a:fld id="{EA307E68-3151-4021-8034-6905DEC8B993}" type="datetimeFigureOut">
               <a:rPr lang="en-US" smtClean="0"/>
-              <a:t>10/27/2023</a:t>
+              <a:t>10/29/2023</a:t>
             </a:fld>
             <a:endParaRPr lang="en-US"/>
           </a:p>
@@ -2032,7 +2192,7 @@
           <a:p>
             <a:fld id="{EA307E68-3151-4021-8034-6905DEC8B993}" type="datetimeFigureOut">
               <a:rPr lang="en-US" smtClean="0"/>
-              <a:t>10/27/2023</a:t>
+              <a:t>10/29/2023</a:t>
             </a:fld>
             <a:endParaRPr lang="en-US"/>
           </a:p>
@@ -2309,7 +2469,7 @@
           <a:p>
             <a:fld id="{EA307E68-3151-4021-8034-6905DEC8B993}" type="datetimeFigureOut">
               <a:rPr lang="en-US" smtClean="0"/>
-              <a:t>10/27/2023</a:t>
+              <a:t>10/29/2023</a:t>
             </a:fld>
             <a:endParaRPr lang="en-US"/>
           </a:p>
@@ -2566,7 +2726,7 @@
           <a:p>
             <a:fld id="{EA307E68-3151-4021-8034-6905DEC8B993}" type="datetimeFigureOut">
               <a:rPr lang="en-US" smtClean="0"/>
-              <a:t>10/27/2023</a:t>
+              <a:t>10/29/2023</a:t>
             </a:fld>
             <a:endParaRPr lang="en-US"/>
           </a:p>
@@ -2779,7 +2939,7 @@
           <a:p>
             <a:fld id="{EA307E68-3151-4021-8034-6905DEC8B993}" type="datetimeFigureOut">
               <a:rPr lang="en-US" smtClean="0"/>
-              <a:t>10/27/2023</a:t>
+              <a:t>10/29/2023</a:t>
             </a:fld>
             <a:endParaRPr lang="en-US"/>
           </a:p>
@@ -3184,114 +3344,493 @@
           <a:chExt cx="0" cy="0"/>
         </a:xfrm>
       </p:grpSpPr>
-      <p:pic>
-        <p:nvPicPr>
-          <p:cNvPr id="9" name="Picture 8">
+      <p:grpSp>
+        <p:nvGrpSpPr>
+          <p:cNvPr id="6" name="Group 5">
             <a:extLst>
               <a:ext uri="{FF2B5EF4-FFF2-40B4-BE49-F238E27FC236}">
-                <a16:creationId xmlns:a16="http://schemas.microsoft.com/office/drawing/2014/main" id="{B5B8D332-926C-C7BA-9B83-B538091B55F6}"/>
+                <a16:creationId xmlns:a16="http://schemas.microsoft.com/office/drawing/2014/main" id="{87798A15-81C8-2DD8-7DC5-90FD6EEB0345}"/>
               </a:ext>
             </a:extLst>
           </p:cNvPr>
-          <p:cNvPicPr>
-            <a:picLocks noChangeAspect="1"/>
-          </p:cNvPicPr>
+          <p:cNvGrpSpPr/>
           <p:nvPr/>
-        </p:nvPicPr>
-        <p:blipFill>
-          <a:blip r:embed="rId2">
-            <a:extLst>
-              <a:ext uri="{28A0092B-C50C-407E-A947-70E740481C1C}">
-                <a14:useLocalDpi xmlns:a14="http://schemas.microsoft.com/office/drawing/2010/main" val="0"/>
-              </a:ext>
-            </a:extLst>
-          </a:blip>
-          <a:stretch>
-            <a:fillRect/>
-          </a:stretch>
-        </p:blipFill>
-        <p:spPr>
+        </p:nvGrpSpPr>
+        <p:grpSpPr>
           <a:xfrm>
-            <a:off x="1676400" y="4950441"/>
-            <a:ext cx="4146472" cy="1404272"/>
+            <a:off x="731248" y="1219200"/>
+            <a:ext cx="5091624" cy="5135513"/>
+            <a:chOff x="731248" y="1219200"/>
+            <a:chExt cx="5091624" cy="5135513"/>
           </a:xfrm>
-          <a:prstGeom prst="rect">
-            <a:avLst/>
-          </a:prstGeom>
-        </p:spPr>
-      </p:pic>
-      <p:pic>
-        <p:nvPicPr>
-          <p:cNvPr id="11" name="Picture 10">
+        </p:grpSpPr>
+        <p:pic>
+          <p:nvPicPr>
+            <p:cNvPr id="9" name="Picture 8">
+              <a:extLst>
+                <a:ext uri="{FF2B5EF4-FFF2-40B4-BE49-F238E27FC236}">
+                  <a16:creationId xmlns:a16="http://schemas.microsoft.com/office/drawing/2014/main" id="{B5B8D332-926C-C7BA-9B83-B538091B55F6}"/>
+                </a:ext>
+              </a:extLst>
+            </p:cNvPr>
+            <p:cNvPicPr>
+              <a:picLocks noChangeAspect="1"/>
+            </p:cNvPicPr>
+            <p:nvPr/>
+          </p:nvPicPr>
+          <p:blipFill>
+            <a:blip r:embed="rId2">
+              <a:extLst>
+                <a:ext uri="{28A0092B-C50C-407E-A947-70E740481C1C}">
+                  <a14:useLocalDpi xmlns:a14="http://schemas.microsoft.com/office/drawing/2010/main" val="0"/>
+                </a:ext>
+              </a:extLst>
+            </a:blip>
+            <a:stretch>
+              <a:fillRect/>
+            </a:stretch>
+          </p:blipFill>
+          <p:spPr>
+            <a:xfrm>
+              <a:off x="1676400" y="4950441"/>
+              <a:ext cx="4146472" cy="1404272"/>
+            </a:xfrm>
+            <a:prstGeom prst="rect">
+              <a:avLst/>
+            </a:prstGeom>
+          </p:spPr>
+        </p:pic>
+        <p:pic>
+          <p:nvPicPr>
+            <p:cNvPr id="11" name="Picture 10">
+              <a:extLst>
+                <a:ext uri="{FF2B5EF4-FFF2-40B4-BE49-F238E27FC236}">
+                  <a16:creationId xmlns:a16="http://schemas.microsoft.com/office/drawing/2014/main" id="{E362918E-6954-3B1B-DF77-B655EA6C452E}"/>
+                </a:ext>
+              </a:extLst>
+            </p:cNvPr>
+            <p:cNvPicPr>
+              <a:picLocks noChangeAspect="1"/>
+            </p:cNvPicPr>
+            <p:nvPr/>
+          </p:nvPicPr>
+          <p:blipFill>
+            <a:blip r:embed="rId3">
+              <a:extLst>
+                <a:ext uri="{28A0092B-C50C-407E-A947-70E740481C1C}">
+                  <a14:useLocalDpi xmlns:a14="http://schemas.microsoft.com/office/drawing/2010/main" val="0"/>
+                </a:ext>
+              </a:extLst>
+            </a:blip>
+            <a:stretch>
+              <a:fillRect/>
+            </a:stretch>
+          </p:blipFill>
+          <p:spPr>
+            <a:xfrm>
+              <a:off x="1676400" y="1274699"/>
+              <a:ext cx="4146472" cy="3545694"/>
+            </a:xfrm>
+            <a:prstGeom prst="rect">
+              <a:avLst/>
+            </a:prstGeom>
+          </p:spPr>
+        </p:pic>
+        <p:pic>
+          <p:nvPicPr>
+            <p:cNvPr id="15" name="Picture 14">
+              <a:extLst>
+                <a:ext uri="{FF2B5EF4-FFF2-40B4-BE49-F238E27FC236}">
+                  <a16:creationId xmlns:a16="http://schemas.microsoft.com/office/drawing/2014/main" id="{6F9F2A86-D911-18F5-691D-899F6EA47EBA}"/>
+                </a:ext>
+              </a:extLst>
+            </p:cNvPr>
+            <p:cNvPicPr>
+              <a:picLocks noChangeAspect="1"/>
+            </p:cNvPicPr>
+            <p:nvPr/>
+          </p:nvPicPr>
+          <p:blipFill>
+            <a:blip r:embed="rId4"/>
+            <a:stretch>
+              <a:fillRect/>
+            </a:stretch>
+          </p:blipFill>
+          <p:spPr>
+            <a:xfrm>
+              <a:off x="1756204" y="4277536"/>
+              <a:ext cx="3987372" cy="534777"/>
+            </a:xfrm>
+            <a:prstGeom prst="rect">
+              <a:avLst/>
+            </a:prstGeom>
+          </p:spPr>
+        </p:pic>
+        <p:sp>
+          <p:nvSpPr>
+            <p:cNvPr id="16" name="TextBox 15">
+              <a:extLst>
+                <a:ext uri="{FF2B5EF4-FFF2-40B4-BE49-F238E27FC236}">
+                  <a16:creationId xmlns:a16="http://schemas.microsoft.com/office/drawing/2014/main" id="{7FFE27DD-6947-F70A-917B-26A58299303D}"/>
+                </a:ext>
+              </a:extLst>
+            </p:cNvPr>
+            <p:cNvSpPr txBox="1"/>
+            <p:nvPr/>
+          </p:nvSpPr>
+          <p:spPr>
+            <a:xfrm>
+              <a:off x="835773" y="1219200"/>
+              <a:ext cx="874959" cy="646331"/>
+            </a:xfrm>
+            <a:prstGeom prst="rect">
+              <a:avLst/>
+            </a:prstGeom>
+            <a:noFill/>
+          </p:spPr>
+          <p:txBody>
+            <a:bodyPr wrap="square" rtlCol="0">
+              <a:spAutoFit/>
+            </a:bodyPr>
+            <a:lstStyle/>
+            <a:p>
+              <a:pPr algn="ctr"/>
+              <a:r>
+                <a:rPr lang="en-US" dirty="0">
+                  <a:solidFill>
+                    <a:schemeClr val="accent1"/>
+                  </a:solidFill>
+                </a:rPr>
+                <a:t>Select this</a:t>
+              </a:r>
+            </a:p>
+          </p:txBody>
+        </p:sp>
+        <p:sp>
+          <p:nvSpPr>
+            <p:cNvPr id="17" name="TextBox 16">
+              <a:extLst>
+                <a:ext uri="{FF2B5EF4-FFF2-40B4-BE49-F238E27FC236}">
+                  <a16:creationId xmlns:a16="http://schemas.microsoft.com/office/drawing/2014/main" id="{FDA87858-ED50-B542-5CEA-D7A03A25CD80}"/>
+                </a:ext>
+              </a:extLst>
+            </p:cNvPr>
+            <p:cNvSpPr txBox="1"/>
+            <p:nvPr/>
+          </p:nvSpPr>
+          <p:spPr>
+            <a:xfrm>
+              <a:off x="849066" y="4382243"/>
+              <a:ext cx="874959" cy="646331"/>
+            </a:xfrm>
+            <a:prstGeom prst="rect">
+              <a:avLst/>
+            </a:prstGeom>
+            <a:noFill/>
+          </p:spPr>
+          <p:txBody>
+            <a:bodyPr wrap="square" rtlCol="0">
+              <a:spAutoFit/>
+            </a:bodyPr>
+            <a:lstStyle>
+              <a:defPPr>
+                <a:defRPr lang="en-US"/>
+              </a:defPPr>
+              <a:lvl1pPr algn="ctr">
+                <a:defRPr>
+                  <a:solidFill>
+                    <a:schemeClr val="accent1"/>
+                  </a:solidFill>
+                </a:defRPr>
+              </a:lvl1pPr>
+            </a:lstStyle>
+            <a:p>
+              <a:r>
+                <a:rPr lang="en-US" dirty="0"/>
+                <a:t>Select this</a:t>
+              </a:r>
+            </a:p>
+          </p:txBody>
+        </p:sp>
+        <p:cxnSp>
+          <p:nvCxnSpPr>
+            <p:cNvPr id="19" name="Straight Connector 18">
+              <a:extLst>
+                <a:ext uri="{FF2B5EF4-FFF2-40B4-BE49-F238E27FC236}">
+                  <a16:creationId xmlns:a16="http://schemas.microsoft.com/office/drawing/2014/main" id="{C6D52313-B39E-ED70-00B0-38EA885C93A1}"/>
+                </a:ext>
+              </a:extLst>
+            </p:cNvPr>
+            <p:cNvCxnSpPr/>
+            <p:nvPr/>
+          </p:nvCxnSpPr>
+          <p:spPr>
+            <a:xfrm>
+              <a:off x="1485900" y="1759982"/>
+              <a:ext cx="323850" cy="211693"/>
+            </a:xfrm>
+            <a:prstGeom prst="line">
+              <a:avLst/>
+            </a:prstGeom>
+            <a:ln w="28575"/>
+          </p:spPr>
+          <p:style>
+            <a:lnRef idx="1">
+              <a:schemeClr val="accent1"/>
+            </a:lnRef>
+            <a:fillRef idx="0">
+              <a:schemeClr val="accent1"/>
+            </a:fillRef>
+            <a:effectRef idx="0">
+              <a:schemeClr val="accent1"/>
+            </a:effectRef>
+            <a:fontRef idx="minor">
+              <a:schemeClr val="tx1"/>
+            </a:fontRef>
+          </p:style>
+        </p:cxnSp>
+        <p:cxnSp>
+          <p:nvCxnSpPr>
+            <p:cNvPr id="20" name="Straight Connector 19">
+              <a:extLst>
+                <a:ext uri="{FF2B5EF4-FFF2-40B4-BE49-F238E27FC236}">
+                  <a16:creationId xmlns:a16="http://schemas.microsoft.com/office/drawing/2014/main" id="{59FA40A0-43B2-7927-5632-154E835C24EA}"/>
+                </a:ext>
+              </a:extLst>
+            </p:cNvPr>
+            <p:cNvCxnSpPr/>
+            <p:nvPr/>
+          </p:nvCxnSpPr>
+          <p:spPr>
+            <a:xfrm>
+              <a:off x="1485900" y="4921442"/>
+              <a:ext cx="323850" cy="211693"/>
+            </a:xfrm>
+            <a:prstGeom prst="line">
+              <a:avLst/>
+            </a:prstGeom>
+            <a:ln w="28575"/>
+          </p:spPr>
+          <p:style>
+            <a:lnRef idx="1">
+              <a:schemeClr val="accent1"/>
+            </a:lnRef>
+            <a:fillRef idx="0">
+              <a:schemeClr val="accent1"/>
+            </a:fillRef>
+            <a:effectRef idx="0">
+              <a:schemeClr val="accent1"/>
+            </a:effectRef>
+            <a:fontRef idx="minor">
+              <a:schemeClr val="tx1"/>
+            </a:fontRef>
+          </p:style>
+        </p:cxnSp>
+        <p:pic>
+          <p:nvPicPr>
+            <p:cNvPr id="7" name="Picture 6">
+              <a:extLst>
+                <a:ext uri="{FF2B5EF4-FFF2-40B4-BE49-F238E27FC236}">
+                  <a16:creationId xmlns:a16="http://schemas.microsoft.com/office/drawing/2014/main" id="{BD8D348B-9B09-85F0-598C-37F5739B0C29}"/>
+                </a:ext>
+              </a:extLst>
+            </p:cNvPr>
+            <p:cNvPicPr>
+              <a:picLocks noChangeAspect="1"/>
+            </p:cNvPicPr>
+            <p:nvPr/>
+          </p:nvPicPr>
+          <p:blipFill>
+            <a:blip r:embed="rId5">
+              <a:extLst>
+                <a:ext uri="{28A0092B-C50C-407E-A947-70E740481C1C}">
+                  <a14:useLocalDpi xmlns:a14="http://schemas.microsoft.com/office/drawing/2010/main" val="0"/>
+                </a:ext>
+              </a:extLst>
+            </a:blip>
+            <a:stretch>
+              <a:fillRect/>
+            </a:stretch>
+          </p:blipFill>
+          <p:spPr>
+            <a:xfrm>
+              <a:off x="835773" y="1219200"/>
+              <a:ext cx="4866667" cy="4400000"/>
+            </a:xfrm>
+            <a:prstGeom prst="rect">
+              <a:avLst/>
+            </a:prstGeom>
+          </p:spPr>
+        </p:pic>
+        <p:sp>
+          <p:nvSpPr>
+            <p:cNvPr id="3" name="Rectangle 2">
+              <a:extLst>
+                <a:ext uri="{FF2B5EF4-FFF2-40B4-BE49-F238E27FC236}">
+                  <a16:creationId xmlns:a16="http://schemas.microsoft.com/office/drawing/2014/main" id="{15A83833-3350-0AE5-7A76-6357C1B48DF2}"/>
+                </a:ext>
+              </a:extLst>
+            </p:cNvPr>
+            <p:cNvSpPr/>
+            <p:nvPr/>
+          </p:nvSpPr>
+          <p:spPr>
+            <a:xfrm>
+              <a:off x="835773" y="1219200"/>
+              <a:ext cx="973977" cy="922116"/>
+            </a:xfrm>
+            <a:prstGeom prst="rect">
+              <a:avLst/>
+            </a:prstGeom>
+            <a:solidFill>
+              <a:schemeClr val="bg1"/>
+            </a:solidFill>
+            <a:ln>
+              <a:solidFill>
+                <a:schemeClr val="bg1"/>
+              </a:solidFill>
+            </a:ln>
+          </p:spPr>
+          <p:style>
+            <a:lnRef idx="2">
+              <a:schemeClr val="accent1">
+                <a:shade val="15000"/>
+              </a:schemeClr>
+            </a:lnRef>
+            <a:fillRef idx="1">
+              <a:schemeClr val="accent1"/>
+            </a:fillRef>
+            <a:effectRef idx="0">
+              <a:schemeClr val="accent1"/>
+            </a:effectRef>
+            <a:fontRef idx="minor">
+              <a:schemeClr val="lt1"/>
+            </a:fontRef>
+          </p:style>
+          <p:txBody>
+            <a:bodyPr rtlCol="0" anchor="ctr"/>
+            <a:lstStyle/>
+            <a:p>
+              <a:pPr algn="ctr"/>
+              <a:endParaRPr lang="en-US"/>
+            </a:p>
+          </p:txBody>
+        </p:sp>
+        <p:sp>
+          <p:nvSpPr>
+            <p:cNvPr id="4" name="Rectangle 3">
+              <a:extLst>
+                <a:ext uri="{FF2B5EF4-FFF2-40B4-BE49-F238E27FC236}">
+                  <a16:creationId xmlns:a16="http://schemas.microsoft.com/office/drawing/2014/main" id="{B4C1F2D1-C183-05EA-A130-1BA626B50822}"/>
+                </a:ext>
+              </a:extLst>
+            </p:cNvPr>
+            <p:cNvSpPr/>
+            <p:nvPr/>
+          </p:nvSpPr>
+          <p:spPr>
+            <a:xfrm>
+              <a:off x="731248" y="4483960"/>
+              <a:ext cx="973977" cy="787512"/>
+            </a:xfrm>
+            <a:prstGeom prst="rect">
+              <a:avLst/>
+            </a:prstGeom>
+            <a:solidFill>
+              <a:schemeClr val="bg1"/>
+            </a:solidFill>
+            <a:ln>
+              <a:solidFill>
+                <a:schemeClr val="bg1"/>
+              </a:solidFill>
+            </a:ln>
+          </p:spPr>
+          <p:style>
+            <a:lnRef idx="2">
+              <a:schemeClr val="accent1">
+                <a:shade val="15000"/>
+              </a:schemeClr>
+            </a:lnRef>
+            <a:fillRef idx="1">
+              <a:schemeClr val="accent1"/>
+            </a:fillRef>
+            <a:effectRef idx="0">
+              <a:schemeClr val="accent1"/>
+            </a:effectRef>
+            <a:fontRef idx="minor">
+              <a:schemeClr val="lt1"/>
+            </a:fontRef>
+          </p:style>
+          <p:txBody>
+            <a:bodyPr rtlCol="0" anchor="ctr"/>
+            <a:lstStyle/>
+            <a:p>
+              <a:pPr algn="ctr"/>
+              <a:endParaRPr lang="en-US"/>
+            </a:p>
+          </p:txBody>
+        </p:sp>
+        <p:sp>
+          <p:nvSpPr>
+            <p:cNvPr id="5" name="Rectangle 4">
+              <a:extLst>
+                <a:ext uri="{FF2B5EF4-FFF2-40B4-BE49-F238E27FC236}">
+                  <a16:creationId xmlns:a16="http://schemas.microsoft.com/office/drawing/2014/main" id="{6A4D6D54-257D-8402-7A79-E36C201BE877}"/>
+                </a:ext>
+              </a:extLst>
+            </p:cNvPr>
+            <p:cNvSpPr/>
+            <p:nvPr/>
+          </p:nvSpPr>
+          <p:spPr>
+            <a:xfrm>
+              <a:off x="848923" y="4867855"/>
+              <a:ext cx="973977" cy="306001"/>
+            </a:xfrm>
+            <a:prstGeom prst="rect">
+              <a:avLst/>
+            </a:prstGeom>
+            <a:solidFill>
+              <a:schemeClr val="bg1"/>
+            </a:solidFill>
+            <a:ln>
+              <a:solidFill>
+                <a:schemeClr val="bg1"/>
+              </a:solidFill>
+            </a:ln>
+          </p:spPr>
+          <p:style>
+            <a:lnRef idx="2">
+              <a:schemeClr val="accent1">
+                <a:shade val="15000"/>
+              </a:schemeClr>
+            </a:lnRef>
+            <a:fillRef idx="1">
+              <a:schemeClr val="accent1"/>
+            </a:fillRef>
+            <a:effectRef idx="0">
+              <a:schemeClr val="accent1"/>
+            </a:effectRef>
+            <a:fontRef idx="minor">
+              <a:schemeClr val="lt1"/>
+            </a:fontRef>
+          </p:style>
+          <p:txBody>
+            <a:bodyPr rtlCol="0" anchor="ctr"/>
+            <a:lstStyle/>
+            <a:p>
+              <a:pPr algn="ctr"/>
+              <a:endParaRPr lang="en-US"/>
+            </a:p>
+          </p:txBody>
+        </p:sp>
+      </p:grpSp>
+      <p:sp>
+        <p:nvSpPr>
+          <p:cNvPr id="2" name="TextBox 1">
             <a:extLst>
               <a:ext uri="{FF2B5EF4-FFF2-40B4-BE49-F238E27FC236}">
-                <a16:creationId xmlns:a16="http://schemas.microsoft.com/office/drawing/2014/main" id="{E362918E-6954-3B1B-DF77-B655EA6C452E}"/>
-              </a:ext>
-            </a:extLst>
-          </p:cNvPr>
-          <p:cNvPicPr>
-            <a:picLocks noChangeAspect="1"/>
-          </p:cNvPicPr>
-          <p:nvPr/>
-        </p:nvPicPr>
-        <p:blipFill>
-          <a:blip r:embed="rId3">
-            <a:extLst>
-              <a:ext uri="{28A0092B-C50C-407E-A947-70E740481C1C}">
-                <a14:useLocalDpi xmlns:a14="http://schemas.microsoft.com/office/drawing/2010/main" val="0"/>
-              </a:ext>
-            </a:extLst>
-          </a:blip>
-          <a:stretch>
-            <a:fillRect/>
-          </a:stretch>
-        </p:blipFill>
-        <p:spPr>
-          <a:xfrm>
-            <a:off x="1676400" y="1274699"/>
-            <a:ext cx="4146472" cy="3545694"/>
-          </a:xfrm>
-          <a:prstGeom prst="rect">
-            <a:avLst/>
-          </a:prstGeom>
-        </p:spPr>
-      </p:pic>
-      <p:pic>
-        <p:nvPicPr>
-          <p:cNvPr id="15" name="Picture 14">
-            <a:extLst>
-              <a:ext uri="{FF2B5EF4-FFF2-40B4-BE49-F238E27FC236}">
-                <a16:creationId xmlns:a16="http://schemas.microsoft.com/office/drawing/2014/main" id="{6F9F2A86-D911-18F5-691D-899F6EA47EBA}"/>
-              </a:ext>
-            </a:extLst>
-          </p:cNvPr>
-          <p:cNvPicPr>
-            <a:picLocks noChangeAspect="1"/>
-          </p:cNvPicPr>
-          <p:nvPr/>
-        </p:nvPicPr>
-        <p:blipFill>
-          <a:blip r:embed="rId4"/>
-          <a:stretch>
-            <a:fillRect/>
-          </a:stretch>
-        </p:blipFill>
-        <p:spPr>
-          <a:xfrm>
-            <a:off x="1756204" y="4277536"/>
-            <a:ext cx="3987372" cy="534777"/>
-          </a:xfrm>
-          <a:prstGeom prst="rect">
-            <a:avLst/>
-          </a:prstGeom>
-        </p:spPr>
-      </p:pic>
-      <p:sp>
-        <p:nvSpPr>
-          <p:cNvPr id="16" name="TextBox 15">
-            <a:extLst>
-              <a:ext uri="{FF2B5EF4-FFF2-40B4-BE49-F238E27FC236}">
-                <a16:creationId xmlns:a16="http://schemas.microsoft.com/office/drawing/2014/main" id="{7FFE27DD-6947-F70A-917B-26A58299303D}"/>
+                <a16:creationId xmlns:a16="http://schemas.microsoft.com/office/drawing/2014/main" id="{8D618F7A-415B-3E5B-B839-9A1E37697057}"/>
               </a:ext>
             </a:extLst>
           </p:cNvPr>
@@ -3300,8 +3839,8 @@
         </p:nvSpPr>
         <p:spPr>
           <a:xfrm>
-            <a:off x="835773" y="1219200"/>
-            <a:ext cx="874959" cy="646331"/>
+            <a:off x="794637" y="4424866"/>
+            <a:ext cx="853858" cy="646331"/>
           </a:xfrm>
           <a:prstGeom prst="rect">
             <a:avLst/>
@@ -3316,7 +3855,7 @@
           <a:p>
             <a:pPr algn="ctr"/>
             <a:r>
-              <a:rPr lang="en-US" dirty="0">
+              <a:rPr lang="en-US" b="1" dirty="0">
                 <a:solidFill>
                   <a:schemeClr val="accent1"/>
                 </a:solidFill>
@@ -3326,68 +3865,24 @@
           </a:p>
         </p:txBody>
       </p:sp>
-      <p:sp>
-        <p:nvSpPr>
-          <p:cNvPr id="17" name="TextBox 16">
+      <p:cxnSp>
+        <p:nvCxnSpPr>
+          <p:cNvPr id="8" name="Straight Connector 7">
             <a:extLst>
               <a:ext uri="{FF2B5EF4-FFF2-40B4-BE49-F238E27FC236}">
-                <a16:creationId xmlns:a16="http://schemas.microsoft.com/office/drawing/2014/main" id="{FDA87858-ED50-B542-5CEA-D7A03A25CD80}"/>
+                <a16:creationId xmlns:a16="http://schemas.microsoft.com/office/drawing/2014/main" id="{7DCD4D0C-0EC4-E287-17B2-6FBDCB0497D6}"/>
               </a:ext>
             </a:extLst>
           </p:cNvPr>
-          <p:cNvSpPr txBox="1"/>
-          <p:nvPr/>
-        </p:nvSpPr>
-        <p:spPr>
-          <a:xfrm>
-            <a:off x="849066" y="4382243"/>
-            <a:ext cx="874959" cy="646331"/>
-          </a:xfrm>
-          <a:prstGeom prst="rect">
-            <a:avLst/>
-          </a:prstGeom>
-          <a:noFill/>
-        </p:spPr>
-        <p:txBody>
-          <a:bodyPr wrap="square" rtlCol="0">
-            <a:spAutoFit/>
-          </a:bodyPr>
-          <a:lstStyle>
-            <a:defPPr>
-              <a:defRPr lang="en-US"/>
-            </a:defPPr>
-            <a:lvl1pPr algn="ctr">
-              <a:defRPr>
-                <a:solidFill>
-                  <a:schemeClr val="accent1"/>
-                </a:solidFill>
-              </a:defRPr>
-            </a:lvl1pPr>
-          </a:lstStyle>
-          <a:p>
-            <a:r>
-              <a:rPr lang="en-US" dirty="0"/>
-              <a:t>Select this</a:t>
-            </a:r>
-          </a:p>
-        </p:txBody>
-      </p:sp>
-      <p:cxnSp>
-        <p:nvCxnSpPr>
-          <p:cNvPr id="19" name="Straight Connector 18">
-            <a:extLst>
-              <a:ext uri="{FF2B5EF4-FFF2-40B4-BE49-F238E27FC236}">
-                <a16:creationId xmlns:a16="http://schemas.microsoft.com/office/drawing/2014/main" id="{C6D52313-B39E-ED70-00B0-38EA885C93A1}"/>
-              </a:ext>
-            </a:extLst>
-          </p:cNvPr>
-          <p:cNvCxnSpPr/>
+          <p:cNvCxnSpPr>
+            <a:cxnSpLocks/>
+          </p:cNvCxnSpPr>
           <p:nvPr/>
         </p:nvCxnSpPr>
         <p:spPr>
           <a:xfrm>
-            <a:off x="1485900" y="1759982"/>
-            <a:ext cx="323850" cy="211693"/>
+            <a:off x="1444764" y="4914030"/>
+            <a:ext cx="364986" cy="281608"/>
           </a:xfrm>
           <a:prstGeom prst="line">
             <a:avLst/>
@@ -3409,22 +3904,64 @@
           </a:fontRef>
         </p:style>
       </p:cxnSp>
-      <p:cxnSp>
-        <p:nvCxnSpPr>
-          <p:cNvPr id="20" name="Straight Connector 19">
+      <p:sp>
+        <p:nvSpPr>
+          <p:cNvPr id="18" name="TextBox 17">
             <a:extLst>
               <a:ext uri="{FF2B5EF4-FFF2-40B4-BE49-F238E27FC236}">
-                <a16:creationId xmlns:a16="http://schemas.microsoft.com/office/drawing/2014/main" id="{59FA40A0-43B2-7927-5632-154E835C24EA}"/>
+                <a16:creationId xmlns:a16="http://schemas.microsoft.com/office/drawing/2014/main" id="{46136DFE-F0D8-A090-1377-C788132E89A2}"/>
               </a:ext>
             </a:extLst>
           </p:cNvPr>
-          <p:cNvCxnSpPr/>
+          <p:cNvSpPr txBox="1"/>
+          <p:nvPr/>
+        </p:nvSpPr>
+        <p:spPr>
+          <a:xfrm>
+            <a:off x="764157" y="1283463"/>
+            <a:ext cx="853858" cy="646331"/>
+          </a:xfrm>
+          <a:prstGeom prst="rect">
+            <a:avLst/>
+          </a:prstGeom>
+          <a:noFill/>
+        </p:spPr>
+        <p:txBody>
+          <a:bodyPr wrap="square" rtlCol="0">
+            <a:spAutoFit/>
+          </a:bodyPr>
+          <a:lstStyle/>
+          <a:p>
+            <a:pPr algn="ctr"/>
+            <a:r>
+              <a:rPr lang="en-US" b="1" dirty="0">
+                <a:solidFill>
+                  <a:schemeClr val="accent1"/>
+                </a:solidFill>
+              </a:rPr>
+              <a:t>Select this</a:t>
+            </a:r>
+          </a:p>
+        </p:txBody>
+      </p:sp>
+      <p:cxnSp>
+        <p:nvCxnSpPr>
+          <p:cNvPr id="21" name="Straight Connector 20">
+            <a:extLst>
+              <a:ext uri="{FF2B5EF4-FFF2-40B4-BE49-F238E27FC236}">
+                <a16:creationId xmlns:a16="http://schemas.microsoft.com/office/drawing/2014/main" id="{DF0CEFC7-9938-DC5D-7D42-71CA2323D1B0}"/>
+              </a:ext>
+            </a:extLst>
+          </p:cNvPr>
+          <p:cNvCxnSpPr>
+            <a:cxnSpLocks/>
+          </p:cNvCxnSpPr>
           <p:nvPr/>
         </p:nvCxnSpPr>
         <p:spPr>
           <a:xfrm>
-            <a:off x="1485900" y="4921442"/>
-            <a:ext cx="323850" cy="211693"/>
+            <a:off x="1414284" y="1772627"/>
+            <a:ext cx="364986" cy="281608"/>
           </a:xfrm>
           <a:prstGeom prst="line">
             <a:avLst/>
@@ -3446,42 +3983,6 @@
           </a:fontRef>
         </p:style>
       </p:cxnSp>
-      <p:pic>
-        <p:nvPicPr>
-          <p:cNvPr id="7" name="Picture 6">
-            <a:extLst>
-              <a:ext uri="{FF2B5EF4-FFF2-40B4-BE49-F238E27FC236}">
-                <a16:creationId xmlns:a16="http://schemas.microsoft.com/office/drawing/2014/main" id="{BD8D348B-9B09-85F0-598C-37F5739B0C29}"/>
-              </a:ext>
-            </a:extLst>
-          </p:cNvPr>
-          <p:cNvPicPr>
-            <a:picLocks noChangeAspect="1"/>
-          </p:cNvPicPr>
-          <p:nvPr/>
-        </p:nvPicPr>
-        <p:blipFill>
-          <a:blip r:embed="rId5">
-            <a:extLst>
-              <a:ext uri="{28A0092B-C50C-407E-A947-70E740481C1C}">
-                <a14:useLocalDpi xmlns:a14="http://schemas.microsoft.com/office/drawing/2010/main" val="0"/>
-              </a:ext>
-            </a:extLst>
-          </a:blip>
-          <a:stretch>
-            <a:fillRect/>
-          </a:stretch>
-        </p:blipFill>
-        <p:spPr>
-          <a:xfrm>
-            <a:off x="835773" y="1219200"/>
-            <a:ext cx="4866667" cy="4400000"/>
-          </a:xfrm>
-          <a:prstGeom prst="rect">
-            <a:avLst/>
-          </a:prstGeom>
-        </p:spPr>
-      </p:pic>
     </p:spTree>
     <p:extLst>
       <p:ext uri="{BB962C8B-B14F-4D97-AF65-F5344CB8AC3E}">
@@ -3585,10 +4086,10 @@
       </p:pic>
       <p:pic>
         <p:nvPicPr>
-          <p:cNvPr id="8" name="Picture 7">
+          <p:cNvPr id="13" name="Picture 12">
             <a:extLst>
               <a:ext uri="{FF2B5EF4-FFF2-40B4-BE49-F238E27FC236}">
-                <a16:creationId xmlns:a16="http://schemas.microsoft.com/office/drawing/2014/main" id="{27622E98-60DB-D4A1-0902-FA2B65448455}"/>
+                <a16:creationId xmlns:a16="http://schemas.microsoft.com/office/drawing/2014/main" id="{D79BC184-8F5F-1D5D-347B-F1E551AC7D68}"/>
               </a:ext>
             </a:extLst>
           </p:cNvPr>
@@ -3611,44 +4112,8 @@
         </p:blipFill>
         <p:spPr>
           <a:xfrm>
-            <a:off x="1317547" y="7647187"/>
-            <a:ext cx="4222906" cy="1381359"/>
-          </a:xfrm>
-          <a:prstGeom prst="rect">
-            <a:avLst/>
-          </a:prstGeom>
-        </p:spPr>
-      </p:pic>
-      <p:pic>
-        <p:nvPicPr>
-          <p:cNvPr id="13" name="Picture 12">
-            <a:extLst>
-              <a:ext uri="{FF2B5EF4-FFF2-40B4-BE49-F238E27FC236}">
-                <a16:creationId xmlns:a16="http://schemas.microsoft.com/office/drawing/2014/main" id="{D79BC184-8F5F-1D5D-347B-F1E551AC7D68}"/>
-              </a:ext>
-            </a:extLst>
-          </p:cNvPr>
-          <p:cNvPicPr>
-            <a:picLocks noChangeAspect="1"/>
-          </p:cNvPicPr>
-          <p:nvPr/>
-        </p:nvPicPr>
-        <p:blipFill>
-          <a:blip r:embed="rId4">
-            <a:extLst>
-              <a:ext uri="{28A0092B-C50C-407E-A947-70E740481C1C}">
-                <a14:useLocalDpi xmlns:a14="http://schemas.microsoft.com/office/drawing/2010/main" val="0"/>
-              </a:ext>
-            </a:extLst>
-          </a:blip>
-          <a:stretch>
-            <a:fillRect/>
-          </a:stretch>
-        </p:blipFill>
-        <p:spPr>
-          <a:xfrm>
             <a:off x="1317547" y="3943222"/>
-            <a:ext cx="4222906" cy="4091527"/>
+            <a:ext cx="3723377" cy="3607539"/>
           </a:xfrm>
           <a:prstGeom prst="rect">
             <a:avLst/>
@@ -3670,7 +4135,7 @@
           <p:nvPr/>
         </p:nvPicPr>
         <p:blipFill>
-          <a:blip r:embed="rId5"/>
+          <a:blip r:embed="rId4"/>
           <a:stretch>
             <a:fillRect/>
           </a:stretch>
@@ -3741,7 +4206,7 @@
           <p:nvPr/>
         </p:nvPicPr>
         <p:blipFill>
-          <a:blip r:embed="rId6"/>
+          <a:blip r:embed="rId5"/>
           <a:stretch>
             <a:fillRect/>
           </a:stretch>
@@ -3770,8 +4235,8 @@
         </p:nvSpPr>
         <p:spPr>
           <a:xfrm>
-            <a:off x="5442942" y="1715002"/>
-            <a:ext cx="874959" cy="923330"/>
+            <a:off x="5503682" y="1978599"/>
+            <a:ext cx="1039920" cy="2308324"/>
           </a:xfrm>
           <a:prstGeom prst="rect">
             <a:avLst/>
@@ -3791,7 +4256,7 @@
                   <a:schemeClr val="accent1"/>
                 </a:solidFill>
               </a:rPr>
-              <a:t>Don’t click here</a:t>
+              <a:t>Click here to post a message only to the ‘Pet Lost and Found’</a:t>
             </a:r>
           </a:p>
         </p:txBody>
@@ -3812,8 +4277,8 @@
         </p:nvCxnSpPr>
         <p:spPr>
           <a:xfrm flipH="1">
-            <a:off x="5310429" y="2246053"/>
-            <a:ext cx="335531" cy="230559"/>
+            <a:off x="5285295" y="2170366"/>
+            <a:ext cx="497514" cy="400009"/>
           </a:xfrm>
           <a:prstGeom prst="line">
             <a:avLst/>
@@ -3849,8 +4314,8 @@
         </p:nvSpPr>
         <p:spPr>
           <a:xfrm>
-            <a:off x="1280475" y="3160080"/>
-            <a:ext cx="4328413" cy="4755657"/>
+            <a:off x="1280476" y="3160081"/>
+            <a:ext cx="3760448" cy="3761795"/>
           </a:xfrm>
           <a:prstGeom prst="roundRect">
             <a:avLst>
@@ -3906,8 +4371,8 @@
         </p:nvSpPr>
         <p:spPr>
           <a:xfrm>
-            <a:off x="5330386" y="6960937"/>
-            <a:ext cx="644935" cy="553998"/>
+            <a:off x="5190383" y="4500919"/>
+            <a:ext cx="1184852" cy="2215991"/>
           </a:xfrm>
           <a:prstGeom prst="rect">
             <a:avLst/>
@@ -3929,56 +4394,58 @@
                   <a:schemeClr val="accent1"/>
                 </a:solidFill>
               </a:rPr>
-              <a:t>Click here</a:t>
-            </a:r>
-          </a:p>
-        </p:txBody>
-      </p:sp>
-      <p:cxnSp>
-        <p:nvCxnSpPr>
-          <p:cNvPr id="23" name="Straight Connector 22">
-            <a:extLst>
-              <a:ext uri="{FF2B5EF4-FFF2-40B4-BE49-F238E27FC236}">
-                <a16:creationId xmlns:a16="http://schemas.microsoft.com/office/drawing/2014/main" id="{9CEEA6AF-3B91-9FBD-559E-8923C98A58EA}"/>
-              </a:ext>
-            </a:extLst>
-          </p:cNvPr>
-          <p:cNvCxnSpPr>
-            <a:cxnSpLocks/>
-          </p:cNvCxnSpPr>
-          <p:nvPr/>
-        </p:nvCxnSpPr>
-        <p:spPr>
-          <a:xfrm flipH="1">
-            <a:off x="3649224" y="7428998"/>
-            <a:ext cx="1681162" cy="717298"/>
-          </a:xfrm>
-          <a:prstGeom prst="line">
-            <a:avLst/>
-          </a:prstGeom>
-          <a:ln w="28575"/>
-        </p:spPr>
-        <p:style>
-          <a:lnRef idx="1">
-            <a:schemeClr val="accent1"/>
-          </a:lnRef>
-          <a:fillRef idx="0">
-            <a:schemeClr val="accent1"/>
-          </a:fillRef>
-          <a:effectRef idx="0">
-            <a:schemeClr val="accent1"/>
-          </a:effectRef>
-          <a:fontRef idx="minor">
-            <a:schemeClr val="tx1"/>
-          </a:fontRef>
-        </p:style>
-      </p:cxnSp>
+              <a:t>Click here to post a message to all of NextDoor  and to the ‘Pet Lost and Found’</a:t>
+            </a:r>
+          </a:p>
+        </p:txBody>
+      </p:sp>
       <p:pic>
         <p:nvPicPr>
           <p:cNvPr id="30" name="Picture 29">
             <a:extLst>
               <a:ext uri="{FF2B5EF4-FFF2-40B4-BE49-F238E27FC236}">
                 <a16:creationId xmlns:a16="http://schemas.microsoft.com/office/drawing/2014/main" id="{12E57019-AEBA-EA26-A80D-A1839AE2ABB2}"/>
+              </a:ext>
+            </a:extLst>
+          </p:cNvPr>
+          <p:cNvPicPr>
+            <a:picLocks noChangeAspect="1"/>
+          </p:cNvPicPr>
+          <p:nvPr/>
+        </p:nvPicPr>
+        <p:blipFill>
+          <a:blip r:embed="rId6">
+            <a:extLst>
+              <a:ext uri="{28A0092B-C50C-407E-A947-70E740481C1C}">
+                <a14:useLocalDpi xmlns:a14="http://schemas.microsoft.com/office/drawing/2010/main" val="0"/>
+              </a:ext>
+            </a:extLst>
+          </a:blip>
+          <a:stretch>
+            <a:fillRect/>
+          </a:stretch>
+        </p:blipFill>
+        <p:spPr>
+          <a:xfrm>
+            <a:off x="1215890" y="8852004"/>
+            <a:ext cx="4866667" cy="176542"/>
+          </a:xfrm>
+          <a:prstGeom prst="rect">
+            <a:avLst/>
+          </a:prstGeom>
+          <a:ln w="57150">
+            <a:solidFill>
+              <a:schemeClr val="accent1"/>
+            </a:solidFill>
+          </a:ln>
+        </p:spPr>
+      </p:pic>
+      <p:pic>
+        <p:nvPicPr>
+          <p:cNvPr id="5" name="Picture 4">
+            <a:extLst>
+              <a:ext uri="{FF2B5EF4-FFF2-40B4-BE49-F238E27FC236}">
+                <a16:creationId xmlns:a16="http://schemas.microsoft.com/office/drawing/2014/main" id="{F5B540F1-9221-3895-8BC2-736903D9480F}"/>
               </a:ext>
             </a:extLst>
           </p:cNvPr>
@@ -4001,14 +4468,202 @@
         </p:blipFill>
         <p:spPr>
           <a:xfrm>
-            <a:off x="1215890" y="8852004"/>
-            <a:ext cx="4866667" cy="176542"/>
+            <a:off x="1317547" y="6912099"/>
+            <a:ext cx="4222906" cy="743232"/>
           </a:xfrm>
           <a:prstGeom prst="rect">
             <a:avLst/>
           </a:prstGeom>
         </p:spPr>
       </p:pic>
+      <p:sp>
+        <p:nvSpPr>
+          <p:cNvPr id="7" name="TextBox 6">
+            <a:extLst>
+              <a:ext uri="{FF2B5EF4-FFF2-40B4-BE49-F238E27FC236}">
+                <a16:creationId xmlns:a16="http://schemas.microsoft.com/office/drawing/2014/main" id="{BD4DC219-D868-6115-C128-91F328A2E077}"/>
+              </a:ext>
+            </a:extLst>
+          </p:cNvPr>
+          <p:cNvSpPr txBox="1"/>
+          <p:nvPr/>
+        </p:nvSpPr>
+        <p:spPr>
+          <a:xfrm>
+            <a:off x="4735481" y="2137778"/>
+            <a:ext cx="874959" cy="369332"/>
+          </a:xfrm>
+          <a:prstGeom prst="rect">
+            <a:avLst/>
+          </a:prstGeom>
+          <a:noFill/>
+        </p:spPr>
+        <p:txBody>
+          <a:bodyPr wrap="square" rtlCol="0">
+            <a:spAutoFit/>
+          </a:bodyPr>
+          <a:lstStyle/>
+          <a:p>
+            <a:pPr algn="ctr"/>
+            <a:r>
+              <a:rPr lang="en-US" b="1" dirty="0">
+                <a:solidFill>
+                  <a:schemeClr val="accent1"/>
+                </a:solidFill>
+              </a:rPr>
+              <a:t>Btn 2</a:t>
+            </a:r>
+          </a:p>
+        </p:txBody>
+      </p:sp>
+      <p:sp>
+        <p:nvSpPr>
+          <p:cNvPr id="9" name="TextBox 8">
+            <a:extLst>
+              <a:ext uri="{FF2B5EF4-FFF2-40B4-BE49-F238E27FC236}">
+                <a16:creationId xmlns:a16="http://schemas.microsoft.com/office/drawing/2014/main" id="{E0FFCD8B-45B4-43BB-28EA-9E27A66680D2}"/>
+              </a:ext>
+            </a:extLst>
+          </p:cNvPr>
+          <p:cNvSpPr txBox="1"/>
+          <p:nvPr/>
+        </p:nvSpPr>
+        <p:spPr>
+          <a:xfrm>
+            <a:off x="198650" y="8707372"/>
+            <a:ext cx="874959" cy="369332"/>
+          </a:xfrm>
+          <a:prstGeom prst="rect">
+            <a:avLst/>
+          </a:prstGeom>
+          <a:noFill/>
+        </p:spPr>
+        <p:txBody>
+          <a:bodyPr wrap="square" rtlCol="0">
+            <a:spAutoFit/>
+          </a:bodyPr>
+          <a:lstStyle/>
+          <a:p>
+            <a:pPr algn="ctr"/>
+            <a:r>
+              <a:rPr lang="en-US" b="1" dirty="0">
+                <a:solidFill>
+                  <a:schemeClr val="accent1"/>
+                </a:solidFill>
+              </a:rPr>
+              <a:t>82%</a:t>
+            </a:r>
+          </a:p>
+        </p:txBody>
+      </p:sp>
+      <p:sp>
+        <p:nvSpPr>
+          <p:cNvPr id="24" name="Rectangle: Rounded Corners 23">
+            <a:extLst>
+              <a:ext uri="{FF2B5EF4-FFF2-40B4-BE49-F238E27FC236}">
+                <a16:creationId xmlns:a16="http://schemas.microsoft.com/office/drawing/2014/main" id="{090818EA-8152-473B-528B-B8BD0B3442C6}"/>
+              </a:ext>
+            </a:extLst>
+          </p:cNvPr>
+          <p:cNvSpPr/>
+          <p:nvPr/>
+        </p:nvSpPr>
+        <p:spPr>
+          <a:xfrm>
+            <a:off x="3073768" y="6672230"/>
+            <a:ext cx="704548" cy="277272"/>
+          </a:xfrm>
+          <a:prstGeom prst="roundRect">
+            <a:avLst/>
+          </a:prstGeom>
+          <a:solidFill>
+            <a:schemeClr val="bg1"/>
+          </a:solidFill>
+          <a:ln>
+            <a:solidFill>
+              <a:schemeClr val="bg1"/>
+            </a:solidFill>
+          </a:ln>
+        </p:spPr>
+        <p:style>
+          <a:lnRef idx="2">
+            <a:schemeClr val="accent1">
+              <a:shade val="15000"/>
+            </a:schemeClr>
+          </a:lnRef>
+          <a:fillRef idx="1">
+            <a:schemeClr val="accent1"/>
+          </a:fillRef>
+          <a:effectRef idx="0">
+            <a:schemeClr val="accent1"/>
+          </a:effectRef>
+          <a:fontRef idx="minor">
+            <a:schemeClr val="lt1"/>
+          </a:fontRef>
+        </p:style>
+        <p:txBody>
+          <a:bodyPr lIns="0" tIns="0" rIns="0" bIns="0" rtlCol="0" anchor="ctr"/>
+          <a:lstStyle/>
+          <a:p>
+            <a:pPr algn="ctr"/>
+            <a:r>
+              <a:rPr lang="en-US" b="1" dirty="0">
+                <a:solidFill>
+                  <a:schemeClr val="accent1"/>
+                </a:solidFill>
+              </a:rPr>
+              <a:t>Btn</a:t>
+            </a:r>
+            <a:r>
+              <a:rPr lang="en-US" b="1" dirty="0">
+                <a:solidFill>
+                  <a:srgbClr val="0070C0"/>
+                </a:solidFill>
+              </a:rPr>
+              <a:t> 1</a:t>
+            </a:r>
+          </a:p>
+        </p:txBody>
+      </p:sp>
+      <p:cxnSp>
+        <p:nvCxnSpPr>
+          <p:cNvPr id="23" name="Straight Connector 22">
+            <a:extLst>
+              <a:ext uri="{FF2B5EF4-FFF2-40B4-BE49-F238E27FC236}">
+                <a16:creationId xmlns:a16="http://schemas.microsoft.com/office/drawing/2014/main" id="{9CEEA6AF-3B91-9FBD-559E-8923C98A58EA}"/>
+              </a:ext>
+            </a:extLst>
+          </p:cNvPr>
+          <p:cNvCxnSpPr>
+            <a:cxnSpLocks/>
+          </p:cNvCxnSpPr>
+          <p:nvPr/>
+        </p:nvCxnSpPr>
+        <p:spPr>
+          <a:xfrm flipH="1">
+            <a:off x="3577633" y="4684456"/>
+            <a:ext cx="1595327" cy="2418659"/>
+          </a:xfrm>
+          <a:prstGeom prst="line">
+            <a:avLst/>
+          </a:prstGeom>
+          <a:ln w="28575"/>
+        </p:spPr>
+        <p:style>
+          <a:lnRef idx="1">
+            <a:schemeClr val="accent1"/>
+          </a:lnRef>
+          <a:fillRef idx="0">
+            <a:schemeClr val="accent1"/>
+          </a:fillRef>
+          <a:effectRef idx="0">
+            <a:schemeClr val="accent1"/>
+          </a:effectRef>
+          <a:fontRef idx="minor">
+            <a:schemeClr val="tx1"/>
+          </a:fontRef>
+        </p:style>
+      </p:cxnSp>
     </p:spTree>
     <p:extLst>
       <p:ext uri="{BB962C8B-B14F-4D97-AF65-F5344CB8AC3E}">

</xml_diff>

<commit_message>
More tweaking the page
</commit_message>
<xml_diff>
--- a/image/howToPost.pptx
+++ b/image/howToPost.pptx
@@ -118,18 +118,18 @@
   <pc:docChgLst>
     <pc:chgData name="George John" userId="1c7f5d7288d1a48b" providerId="LiveId" clId="{0144DF34-647E-4BF4-ABCB-FB17BAA507B1}"/>
     <pc:docChg chg="undo custSel addSld modSld">
-      <pc:chgData name="George John" userId="1c7f5d7288d1a48b" providerId="LiveId" clId="{0144DF34-647E-4BF4-ABCB-FB17BAA507B1}" dt="2023-10-30T00:41:41.602" v="1260" actId="1076"/>
+      <pc:chgData name="George John" userId="1c7f5d7288d1a48b" providerId="LiveId" clId="{0144DF34-647E-4BF4-ABCB-FB17BAA507B1}" dt="2023-10-30T01:06:33.701" v="1592" actId="1076"/>
       <pc:docMkLst>
         <pc:docMk/>
       </pc:docMkLst>
       <pc:sldChg chg="addSp delSp modSp mod">
-        <pc:chgData name="George John" userId="1c7f5d7288d1a48b" providerId="LiveId" clId="{0144DF34-647E-4BF4-ABCB-FB17BAA507B1}" dt="2023-10-30T00:41:41.602" v="1260" actId="1076"/>
+        <pc:chgData name="George John" userId="1c7f5d7288d1a48b" providerId="LiveId" clId="{0144DF34-647E-4BF4-ABCB-FB17BAA507B1}" dt="2023-10-30T01:06:33.701" v="1592" actId="1076"/>
         <pc:sldMkLst>
           <pc:docMk/>
           <pc:sldMk cId="2429365050" sldId="256"/>
         </pc:sldMkLst>
         <pc:spChg chg="add mod ord">
-          <ac:chgData name="George John" userId="1c7f5d7288d1a48b" providerId="LiveId" clId="{0144DF34-647E-4BF4-ABCB-FB17BAA507B1}" dt="2023-10-30T00:41:22.697" v="1257" actId="1076"/>
+          <ac:chgData name="George John" userId="1c7f5d7288d1a48b" providerId="LiveId" clId="{0144DF34-647E-4BF4-ABCB-FB17BAA507B1}" dt="2023-10-30T00:59:45.576" v="1401" actId="1076"/>
           <ac:spMkLst>
             <pc:docMk/>
             <pc:sldMk cId="2429365050" sldId="256"/>
@@ -160,6 +160,22 @@
             <ac:spMk id="5" creationId="{6A4D6D54-257D-8402-7A79-E36C201BE877}"/>
           </ac:spMkLst>
         </pc:spChg>
+        <pc:spChg chg="add del mod">
+          <ac:chgData name="George John" userId="1c7f5d7288d1a48b" providerId="LiveId" clId="{0144DF34-647E-4BF4-ABCB-FB17BAA507B1}" dt="2023-10-30T00:58:51.537" v="1359" actId="478"/>
+          <ac:spMkLst>
+            <pc:docMk/>
+            <pc:sldMk cId="2429365050" sldId="256"/>
+            <ac:spMk id="10" creationId="{259514FF-7BB7-C337-39B0-7B3957E22181}"/>
+          </ac:spMkLst>
+        </pc:spChg>
+        <pc:spChg chg="add mod">
+          <ac:chgData name="George John" userId="1c7f5d7288d1a48b" providerId="LiveId" clId="{0144DF34-647E-4BF4-ABCB-FB17BAA507B1}" dt="2023-10-30T01:00:56.455" v="1590" actId="20577"/>
+          <ac:spMkLst>
+            <pc:docMk/>
+            <pc:sldMk cId="2429365050" sldId="256"/>
+            <ac:spMk id="14" creationId="{18EA7B5B-CAE0-3626-EB19-684DA946DF2F}"/>
+          </ac:spMkLst>
+        </pc:spChg>
         <pc:spChg chg="mod">
           <ac:chgData name="George John" userId="1c7f5d7288d1a48b" providerId="LiveId" clId="{0144DF34-647E-4BF4-ABCB-FB17BAA507B1}" dt="2023-10-30T00:40:14.656" v="1247" actId="164"/>
           <ac:spMkLst>
@@ -176,12 +192,20 @@
             <ac:spMk id="17" creationId="{FDA87858-ED50-B542-5CEA-D7A03A25CD80}"/>
           </ac:spMkLst>
         </pc:spChg>
-        <pc:spChg chg="add mod">
-          <ac:chgData name="George John" userId="1c7f5d7288d1a48b" providerId="LiveId" clId="{0144DF34-647E-4BF4-ABCB-FB17BAA507B1}" dt="2023-10-30T00:41:41.602" v="1260" actId="1076"/>
+        <pc:spChg chg="add del mod">
+          <ac:chgData name="George John" userId="1c7f5d7288d1a48b" providerId="LiveId" clId="{0144DF34-647E-4BF4-ABCB-FB17BAA507B1}" dt="2023-10-30T01:00:42.832" v="1586" actId="478"/>
           <ac:spMkLst>
             <pc:docMk/>
             <pc:sldMk cId="2429365050" sldId="256"/>
             <ac:spMk id="18" creationId="{46136DFE-F0D8-A090-1377-C788132E89A2}"/>
+          </ac:spMkLst>
+        </pc:spChg>
+        <pc:spChg chg="add mod">
+          <ac:chgData name="George John" userId="1c7f5d7288d1a48b" providerId="LiveId" clId="{0144DF34-647E-4BF4-ABCB-FB17BAA507B1}" dt="2023-10-30T01:06:33.701" v="1592" actId="1076"/>
+          <ac:spMkLst>
+            <pc:docMk/>
+            <pc:sldMk cId="2429365050" sldId="256"/>
+            <ac:spMk id="26" creationId="{ABF3806E-AB4B-845D-010E-5BA5B273A69C}"/>
           </ac:spMkLst>
         </pc:spChg>
         <pc:grpChg chg="add mod">
@@ -256,8 +280,16 @@
             <ac:picMk id="15" creationId="{6F9F2A86-D911-18F5-691D-899F6EA47EBA}"/>
           </ac:picMkLst>
         </pc:picChg>
+        <pc:picChg chg="add mod">
+          <ac:chgData name="George John" userId="1c7f5d7288d1a48b" providerId="LiveId" clId="{0144DF34-647E-4BF4-ABCB-FB17BAA507B1}" dt="2023-10-30T01:06:33.701" v="1592" actId="1076"/>
+          <ac:picMkLst>
+            <pc:docMk/>
+            <pc:sldMk cId="2429365050" sldId="256"/>
+            <ac:picMk id="25" creationId="{136A37AC-EF87-5E99-6EE5-903024D1A9C9}"/>
+          </ac:picMkLst>
+        </pc:picChg>
         <pc:cxnChg chg="add mod">
-          <ac:chgData name="George John" userId="1c7f5d7288d1a48b" providerId="LiveId" clId="{0144DF34-647E-4BF4-ABCB-FB17BAA507B1}" dt="2023-10-30T00:41:26.664" v="1258" actId="14100"/>
+          <ac:chgData name="George John" userId="1c7f5d7288d1a48b" providerId="LiveId" clId="{0144DF34-647E-4BF4-ABCB-FB17BAA507B1}" dt="2023-10-30T01:00:15.058" v="1583" actId="1035"/>
           <ac:cxnSpMkLst>
             <pc:docMk/>
             <pc:sldMk cId="2429365050" sldId="256"/>
@@ -280,12 +312,20 @@
             <ac:cxnSpMk id="20" creationId="{59FA40A0-43B2-7927-5632-154E835C24EA}"/>
           </ac:cxnSpMkLst>
         </pc:cxnChg>
-        <pc:cxnChg chg="add mod">
-          <ac:chgData name="George John" userId="1c7f5d7288d1a48b" providerId="LiveId" clId="{0144DF34-647E-4BF4-ABCB-FB17BAA507B1}" dt="2023-10-30T00:41:41.602" v="1260" actId="1076"/>
+        <pc:cxnChg chg="add del mod">
+          <ac:chgData name="George John" userId="1c7f5d7288d1a48b" providerId="LiveId" clId="{0144DF34-647E-4BF4-ABCB-FB17BAA507B1}" dt="2023-10-30T01:00:42.832" v="1586" actId="478"/>
           <ac:cxnSpMkLst>
             <pc:docMk/>
             <pc:sldMk cId="2429365050" sldId="256"/>
             <ac:cxnSpMk id="21" creationId="{DF0CEFC7-9938-DC5D-7D42-71CA2323D1B0}"/>
+          </ac:cxnSpMkLst>
+        </pc:cxnChg>
+        <pc:cxnChg chg="add mod">
+          <ac:chgData name="George John" userId="1c7f5d7288d1a48b" providerId="LiveId" clId="{0144DF34-647E-4BF4-ABCB-FB17BAA507B1}" dt="2023-10-30T01:00:54.497" v="1588" actId="14100"/>
+          <ac:cxnSpMkLst>
+            <pc:docMk/>
+            <pc:sldMk cId="2429365050" sldId="256"/>
+            <ac:cxnSpMk id="22" creationId="{6A967B6C-CF22-19BB-9AE1-A909C742EA02}"/>
           </ac:cxnSpMkLst>
         </pc:cxnChg>
       </pc:sldChg>
@@ -3839,8 +3879,8 @@
         </p:nvSpPr>
         <p:spPr>
           <a:xfrm>
-            <a:off x="794637" y="4424866"/>
-            <a:ext cx="853858" cy="646331"/>
+            <a:off x="5383836" y="4612776"/>
+            <a:ext cx="1037679" cy="646331"/>
           </a:xfrm>
           <a:prstGeom prst="rect">
             <a:avLst/>
@@ -3860,7 +3900,7 @@
                   <a:schemeClr val="accent1"/>
                 </a:solidFill>
               </a:rPr>
-              <a:t>Select this</a:t>
+              <a:t>#2 Select this</a:t>
             </a:r>
           </a:p>
         </p:txBody>
@@ -3880,9 +3920,9 @@
           <p:nvPr/>
         </p:nvCxnSpPr>
         <p:spPr>
-          <a:xfrm>
-            <a:off x="1444764" y="4914030"/>
-            <a:ext cx="364986" cy="281608"/>
+          <a:xfrm flipH="1">
+            <a:off x="5508289" y="4902979"/>
+            <a:ext cx="91734" cy="246484"/>
           </a:xfrm>
           <a:prstGeom prst="line">
             <a:avLst/>
@@ -3906,10 +3946,10 @@
       </p:cxnSp>
       <p:sp>
         <p:nvSpPr>
-          <p:cNvPr id="18" name="TextBox 17">
+          <p:cNvPr id="14" name="TextBox 13">
             <a:extLst>
               <a:ext uri="{FF2B5EF4-FFF2-40B4-BE49-F238E27FC236}">
-                <a16:creationId xmlns:a16="http://schemas.microsoft.com/office/drawing/2014/main" id="{46136DFE-F0D8-A090-1377-C788132E89A2}"/>
+                <a16:creationId xmlns:a16="http://schemas.microsoft.com/office/drawing/2014/main" id="{18EA7B5B-CAE0-3626-EB19-684DA946DF2F}"/>
               </a:ext>
             </a:extLst>
           </p:cNvPr>
@@ -3918,8 +3958,8 @@
         </p:nvSpPr>
         <p:spPr>
           <a:xfrm>
-            <a:off x="764157" y="1283463"/>
-            <a:ext cx="853858" cy="646331"/>
+            <a:off x="5255216" y="1271142"/>
+            <a:ext cx="1037679" cy="646331"/>
           </a:xfrm>
           <a:prstGeom prst="rect">
             <a:avLst/>
@@ -3939,17 +3979,17 @@
                   <a:schemeClr val="accent1"/>
                 </a:solidFill>
               </a:rPr>
-              <a:t>Select this</a:t>
+              <a:t>#1 Select this</a:t>
             </a:r>
           </a:p>
         </p:txBody>
       </p:sp>
       <p:cxnSp>
         <p:nvCxnSpPr>
-          <p:cNvPr id="21" name="Straight Connector 20">
+          <p:cNvPr id="22" name="Straight Connector 21">
             <a:extLst>
               <a:ext uri="{FF2B5EF4-FFF2-40B4-BE49-F238E27FC236}">
-                <a16:creationId xmlns:a16="http://schemas.microsoft.com/office/drawing/2014/main" id="{DF0CEFC7-9938-DC5D-7D42-71CA2323D1B0}"/>
+                <a16:creationId xmlns:a16="http://schemas.microsoft.com/office/drawing/2014/main" id="{6A967B6C-CF22-19BB-9AE1-A909C742EA02}"/>
               </a:ext>
             </a:extLst>
           </p:cNvPr>
@@ -3959,9 +3999,9 @@
           <p:nvPr/>
         </p:nvCxnSpPr>
         <p:spPr>
-          <a:xfrm>
-            <a:off x="1414284" y="1772627"/>
-            <a:ext cx="364986" cy="281608"/>
+          <a:xfrm flipH="1">
+            <a:off x="5431809" y="1555845"/>
+            <a:ext cx="109182" cy="390627"/>
           </a:xfrm>
           <a:prstGeom prst="line">
             <a:avLst/>
@@ -3983,6 +4023,87 @@
           </a:fontRef>
         </p:style>
       </p:cxnSp>
+      <p:pic>
+        <p:nvPicPr>
+          <p:cNvPr id="25" name="Picture 24">
+            <a:extLst>
+              <a:ext uri="{FF2B5EF4-FFF2-40B4-BE49-F238E27FC236}">
+                <a16:creationId xmlns:a16="http://schemas.microsoft.com/office/drawing/2014/main" id="{136A37AC-EF87-5E99-6EE5-903024D1A9C9}"/>
+              </a:ext>
+            </a:extLst>
+          </p:cNvPr>
+          <p:cNvPicPr>
+            <a:picLocks noChangeAspect="1"/>
+          </p:cNvPicPr>
+          <p:nvPr/>
+        </p:nvPicPr>
+        <p:blipFill>
+          <a:blip r:embed="rId5">
+            <a:extLst>
+              <a:ext uri="{28A0092B-C50C-407E-A947-70E740481C1C}">
+                <a14:useLocalDpi xmlns:a14="http://schemas.microsoft.com/office/drawing/2010/main" val="0"/>
+              </a:ext>
+            </a:extLst>
+          </a:blip>
+          <a:stretch>
+            <a:fillRect/>
+          </a:stretch>
+        </p:blipFill>
+        <p:spPr>
+          <a:xfrm>
+            <a:off x="1676400" y="5879783"/>
+            <a:ext cx="4866667" cy="176542"/>
+          </a:xfrm>
+          <a:prstGeom prst="rect">
+            <a:avLst/>
+          </a:prstGeom>
+          <a:ln w="57150">
+            <a:solidFill>
+              <a:schemeClr val="accent1"/>
+            </a:solidFill>
+          </a:ln>
+        </p:spPr>
+      </p:pic>
+      <p:sp>
+        <p:nvSpPr>
+          <p:cNvPr id="26" name="TextBox 25">
+            <a:extLst>
+              <a:ext uri="{FF2B5EF4-FFF2-40B4-BE49-F238E27FC236}">
+                <a16:creationId xmlns:a16="http://schemas.microsoft.com/office/drawing/2014/main" id="{ABF3806E-AB4B-845D-010E-5BA5B273A69C}"/>
+              </a:ext>
+            </a:extLst>
+          </p:cNvPr>
+          <p:cNvSpPr txBox="1"/>
+          <p:nvPr/>
+        </p:nvSpPr>
+        <p:spPr>
+          <a:xfrm>
+            <a:off x="659160" y="5735151"/>
+            <a:ext cx="874959" cy="369332"/>
+          </a:xfrm>
+          <a:prstGeom prst="rect">
+            <a:avLst/>
+          </a:prstGeom>
+          <a:noFill/>
+        </p:spPr>
+        <p:txBody>
+          <a:bodyPr wrap="square" rtlCol="0">
+            <a:spAutoFit/>
+          </a:bodyPr>
+          <a:lstStyle/>
+          <a:p>
+            <a:pPr algn="ctr"/>
+            <a:r>
+              <a:rPr lang="en-US" b="1" dirty="0">
+                <a:solidFill>
+                  <a:schemeClr val="accent1"/>
+                </a:solidFill>
+              </a:rPr>
+              <a:t>82%</a:t>
+            </a:r>
+          </a:p>
+        </p:txBody>
+      </p:sp>
     </p:spTree>
     <p:extLst>
       <p:ext uri="{BB962C8B-B14F-4D97-AF65-F5344CB8AC3E}">

</xml_diff>

<commit_message>
added ai for everyone link
</commit_message>
<xml_diff>
--- a/image/howToPost.pptx
+++ b/image/howToPost.pptx
@@ -8,9 +8,10 @@
     <p:sldId id="256" r:id="rId2"/>
     <p:sldId id="257" r:id="rId3"/>
     <p:sldId id="258" r:id="rId4"/>
-    <p:sldId id="260" r:id="rId5"/>
-    <p:sldId id="261" r:id="rId6"/>
-    <p:sldId id="259" r:id="rId7"/>
+    <p:sldId id="262" r:id="rId5"/>
+    <p:sldId id="260" r:id="rId6"/>
+    <p:sldId id="261" r:id="rId7"/>
+    <p:sldId id="259" r:id="rId8"/>
   </p:sldIdLst>
   <p:sldSz cx="6858000" cy="9144000" type="screen4x3"/>
   <p:notesSz cx="6858000" cy="9144000"/>
@@ -122,7 +123,7 @@
   <pc:docChgLst>
     <pc:chgData name="George John" userId="1c7f5d7288d1a48b" providerId="LiveId" clId="{0144DF34-647E-4BF4-ABCB-FB17BAA507B1}"/>
     <pc:docChg chg="undo custSel addSld modSld">
-      <pc:chgData name="George John" userId="1c7f5d7288d1a48b" providerId="LiveId" clId="{0144DF34-647E-4BF4-ABCB-FB17BAA507B1}" dt="2023-10-30T22:50:52.202" v="3149" actId="20577"/>
+      <pc:chgData name="George John" userId="1c7f5d7288d1a48b" providerId="LiveId" clId="{0144DF34-647E-4BF4-ABCB-FB17BAA507B1}" dt="2023-10-31T19:23:13.894" v="3619" actId="1038"/>
       <pc:docMkLst>
         <pc:docMk/>
       </pc:docMkLst>
@@ -525,13 +526,13 @@
         </pc:cxnChg>
       </pc:sldChg>
       <pc:sldChg chg="addSp modSp new mod">
-        <pc:chgData name="George John" userId="1c7f5d7288d1a48b" providerId="LiveId" clId="{0144DF34-647E-4BF4-ABCB-FB17BAA507B1}" dt="2023-10-30T03:30:50.834" v="1624" actId="313"/>
+        <pc:chgData name="George John" userId="1c7f5d7288d1a48b" providerId="LiveId" clId="{0144DF34-647E-4BF4-ABCB-FB17BAA507B1}" dt="2023-10-31T19:07:19.631" v="3499" actId="20577"/>
         <pc:sldMkLst>
           <pc:docMk/>
           <pc:sldMk cId="1888480241" sldId="258"/>
         </pc:sldMkLst>
         <pc:spChg chg="add mod">
-          <ac:chgData name="George John" userId="1c7f5d7288d1a48b" providerId="LiveId" clId="{0144DF34-647E-4BF4-ABCB-FB17BAA507B1}" dt="2023-10-30T03:30:50.834" v="1624" actId="313"/>
+          <ac:chgData name="George John" userId="1c7f5d7288d1a48b" providerId="LiveId" clId="{0144DF34-647E-4BF4-ABCB-FB17BAA507B1}" dt="2023-10-31T19:07:19.631" v="3499" actId="20577"/>
           <ac:spMkLst>
             <pc:docMk/>
             <pc:sldMk cId="1888480241" sldId="258"/>
@@ -851,7 +852,7 @@
         </pc:cxnChg>
       </pc:sldChg>
       <pc:sldChg chg="addSp modSp new mod">
-        <pc:chgData name="George John" userId="1c7f5d7288d1a48b" providerId="LiveId" clId="{0144DF34-647E-4BF4-ABCB-FB17BAA507B1}" dt="2023-10-30T19:57:29.962" v="2056" actId="1076"/>
+        <pc:chgData name="George John" userId="1c7f5d7288d1a48b" providerId="LiveId" clId="{0144DF34-647E-4BF4-ABCB-FB17BAA507B1}" dt="2023-10-31T19:23:13.894" v="3619" actId="1038"/>
         <pc:sldMkLst>
           <pc:docMk/>
           <pc:sldMk cId="1522941257" sldId="260"/>
@@ -864,12 +865,28 @@
             <ac:spMk id="6" creationId="{C1CEC779-45E1-67C7-FABB-12C35F05E15E}"/>
           </ac:spMkLst>
         </pc:spChg>
+        <pc:spChg chg="add mod">
+          <ac:chgData name="George John" userId="1c7f5d7288d1a48b" providerId="LiveId" clId="{0144DF34-647E-4BF4-ABCB-FB17BAA507B1}" dt="2023-10-31T19:23:13.894" v="3619" actId="1038"/>
+          <ac:spMkLst>
+            <pc:docMk/>
+            <pc:sldMk cId="1522941257" sldId="260"/>
+            <ac:spMk id="11" creationId="{33A7D8A4-B13F-6B06-29E3-15AB5E32F239}"/>
+          </ac:spMkLst>
+        </pc:spChg>
         <pc:picChg chg="add mod">
           <ac:chgData name="George John" userId="1c7f5d7288d1a48b" providerId="LiveId" clId="{0144DF34-647E-4BF4-ABCB-FB17BAA507B1}" dt="2023-10-30T19:56:17.062" v="1989" actId="1076"/>
           <ac:picMkLst>
             <pc:docMk/>
             <pc:sldMk cId="1522941257" sldId="260"/>
             <ac:picMk id="3" creationId="{418689E5-E4A6-29FF-495C-F91A8A66ACA5}"/>
+          </ac:picMkLst>
+        </pc:picChg>
+        <pc:picChg chg="add mod">
+          <ac:chgData name="George John" userId="1c7f5d7288d1a48b" providerId="LiveId" clId="{0144DF34-647E-4BF4-ABCB-FB17BAA507B1}" dt="2023-10-31T19:22:56.422" v="3586" actId="1035"/>
+          <ac:picMkLst>
+            <pc:docMk/>
+            <pc:sldMk cId="1522941257" sldId="260"/>
+            <ac:picMk id="4" creationId="{125FC532-61E8-40AD-12B1-0E94B0A0010D}"/>
           </ac:picMkLst>
         </pc:picChg>
         <pc:cxnChg chg="add mod">
@@ -880,9 +897,17 @@
             <ac:cxnSpMk id="5" creationId="{89182AD7-CA8A-BB9E-D831-7C96A773EE0B}"/>
           </ac:cxnSpMkLst>
         </pc:cxnChg>
+        <pc:cxnChg chg="add mod">
+          <ac:chgData name="George John" userId="1c7f5d7288d1a48b" providerId="LiveId" clId="{0144DF34-647E-4BF4-ABCB-FB17BAA507B1}" dt="2023-10-31T19:22:56.422" v="3586" actId="1035"/>
+          <ac:cxnSpMkLst>
+            <pc:docMk/>
+            <pc:sldMk cId="1522941257" sldId="260"/>
+            <ac:cxnSpMk id="7" creationId="{11A595A2-7844-A506-7C2A-82C1FED4435E}"/>
+          </ac:cxnSpMkLst>
+        </pc:cxnChg>
       </pc:sldChg>
       <pc:sldChg chg="addSp delSp modSp new mod">
-        <pc:chgData name="George John" userId="1c7f5d7288d1a48b" providerId="LiveId" clId="{0144DF34-647E-4BF4-ABCB-FB17BAA507B1}" dt="2023-10-30T22:50:52.202" v="3149" actId="20577"/>
+        <pc:chgData name="George John" userId="1c7f5d7288d1a48b" providerId="LiveId" clId="{0144DF34-647E-4BF4-ABCB-FB17BAA507B1}" dt="2023-10-31T19:10:43.294" v="3514" actId="20577"/>
         <pc:sldMkLst>
           <pc:docMk/>
           <pc:sldMk cId="2622195291" sldId="261"/>
@@ -927,6 +952,14 @@
             <ac:spMk id="6" creationId="{1E0B6612-67A2-755F-9D74-D1971E890ADB}"/>
           </ac:spMkLst>
         </pc:spChg>
+        <pc:spChg chg="add mod">
+          <ac:chgData name="George John" userId="1c7f5d7288d1a48b" providerId="LiveId" clId="{0144DF34-647E-4BF4-ABCB-FB17BAA507B1}" dt="2023-10-31T19:03:09.259" v="3440" actId="1038"/>
+          <ac:spMkLst>
+            <pc:docMk/>
+            <pc:sldMk cId="2622195291" sldId="261"/>
+            <ac:spMk id="8" creationId="{E268462F-70FA-9697-7571-BA87C95B0FCE}"/>
+          </ac:spMkLst>
+        </pc:spChg>
         <pc:spChg chg="add mod ord">
           <ac:chgData name="George John" userId="1c7f5d7288d1a48b" providerId="LiveId" clId="{0144DF34-647E-4BF4-ABCB-FB17BAA507B1}" dt="2023-10-30T22:36:35.053" v="2825" actId="1036"/>
           <ac:spMkLst>
@@ -936,15 +969,23 @@
           </ac:spMkLst>
         </pc:spChg>
         <pc:spChg chg="add mod">
-          <ac:chgData name="George John" userId="1c7f5d7288d1a48b" providerId="LiveId" clId="{0144DF34-647E-4BF4-ABCB-FB17BAA507B1}" dt="2023-10-30T22:36:35.053" v="2825" actId="1036"/>
+          <ac:chgData name="George John" userId="1c7f5d7288d1a48b" providerId="LiveId" clId="{0144DF34-647E-4BF4-ABCB-FB17BAA507B1}" dt="2023-10-31T18:43:35.520" v="3286" actId="207"/>
           <ac:spMkLst>
             <pc:docMk/>
             <pc:sldMk cId="2622195291" sldId="261"/>
             <ac:spMk id="11" creationId="{9967B53D-2130-7059-127B-63C75EDE0CBE}"/>
           </ac:spMkLst>
         </pc:spChg>
+        <pc:spChg chg="add mod">
+          <ac:chgData name="George John" userId="1c7f5d7288d1a48b" providerId="LiveId" clId="{0144DF34-647E-4BF4-ABCB-FB17BAA507B1}" dt="2023-10-31T19:03:33.001" v="3448" actId="20577"/>
+          <ac:spMkLst>
+            <pc:docMk/>
+            <pc:sldMk cId="2622195291" sldId="261"/>
+            <ac:spMk id="13" creationId="{CC9B8F94-E87E-5CEF-F148-56B3250D1A4B}"/>
+          </ac:spMkLst>
+        </pc:spChg>
         <pc:spChg chg="mod topLvl">
-          <ac:chgData name="George John" userId="1c7f5d7288d1a48b" providerId="LiveId" clId="{0144DF34-647E-4BF4-ABCB-FB17BAA507B1}" dt="2023-10-30T22:39:40.858" v="2983" actId="1035"/>
+          <ac:chgData name="George John" userId="1c7f5d7288d1a48b" providerId="LiveId" clId="{0144DF34-647E-4BF4-ABCB-FB17BAA507B1}" dt="2023-10-31T18:44:00.491" v="3289" actId="207"/>
           <ac:spMkLst>
             <pc:docMk/>
             <pc:sldMk cId="2622195291" sldId="261"/>
@@ -960,7 +1001,7 @@
           </ac:spMkLst>
         </pc:spChg>
         <pc:spChg chg="mod">
-          <ac:chgData name="George John" userId="1c7f5d7288d1a48b" providerId="LiveId" clId="{0144DF34-647E-4BF4-ABCB-FB17BAA507B1}" dt="2023-10-30T22:36:35.053" v="2825" actId="1036"/>
+          <ac:chgData name="George John" userId="1c7f5d7288d1a48b" providerId="LiveId" clId="{0144DF34-647E-4BF4-ABCB-FB17BAA507B1}" dt="2023-10-31T18:43:43.810" v="3287" actId="207"/>
           <ac:spMkLst>
             <pc:docMk/>
             <pc:sldMk cId="2622195291" sldId="261"/>
@@ -976,7 +1017,7 @@
           </ac:spMkLst>
         </pc:spChg>
         <pc:spChg chg="mod">
-          <ac:chgData name="George John" userId="1c7f5d7288d1a48b" providerId="LiveId" clId="{0144DF34-647E-4BF4-ABCB-FB17BAA507B1}" dt="2023-10-30T22:39:40.858" v="2983" actId="1035"/>
+          <ac:chgData name="George John" userId="1c7f5d7288d1a48b" providerId="LiveId" clId="{0144DF34-647E-4BF4-ABCB-FB17BAA507B1}" dt="2023-10-31T18:44:08.162" v="3290" actId="207"/>
           <ac:spMkLst>
             <pc:docMk/>
             <pc:sldMk cId="2622195291" sldId="261"/>
@@ -1024,7 +1065,7 @@
           </ac:spMkLst>
         </pc:spChg>
         <pc:spChg chg="add mod">
-          <ac:chgData name="George John" userId="1c7f5d7288d1a48b" providerId="LiveId" clId="{0144DF34-647E-4BF4-ABCB-FB17BAA507B1}" dt="2023-10-30T22:46:56.009" v="3109" actId="1035"/>
+          <ac:chgData name="George John" userId="1c7f5d7288d1a48b" providerId="LiveId" clId="{0144DF34-647E-4BF4-ABCB-FB17BAA507B1}" dt="2023-10-31T19:06:06.703" v="3496" actId="14100"/>
           <ac:spMkLst>
             <pc:docMk/>
             <pc:sldMk cId="2622195291" sldId="261"/>
@@ -1032,7 +1073,7 @@
           </ac:spMkLst>
         </pc:spChg>
         <pc:spChg chg="add mod">
-          <ac:chgData name="George John" userId="1c7f5d7288d1a48b" providerId="LiveId" clId="{0144DF34-647E-4BF4-ABCB-FB17BAA507B1}" dt="2023-10-30T22:50:06.600" v="3146" actId="115"/>
+          <ac:chgData name="George John" userId="1c7f5d7288d1a48b" providerId="LiveId" clId="{0144DF34-647E-4BF4-ABCB-FB17BAA507B1}" dt="2023-10-31T18:47:18.939" v="3363" actId="20577"/>
           <ac:spMkLst>
             <pc:docMk/>
             <pc:sldMk cId="2622195291" sldId="261"/>
@@ -1040,7 +1081,7 @@
           </ac:spMkLst>
         </pc:spChg>
         <pc:spChg chg="add mod">
-          <ac:chgData name="George John" userId="1c7f5d7288d1a48b" providerId="LiveId" clId="{0144DF34-647E-4BF4-ABCB-FB17BAA507B1}" dt="2023-10-30T22:40:31.268" v="3010" actId="207"/>
+          <ac:chgData name="George John" userId="1c7f5d7288d1a48b" providerId="LiveId" clId="{0144DF34-647E-4BF4-ABCB-FB17BAA507B1}" dt="2023-10-31T19:05:26.240" v="3494" actId="20577"/>
           <ac:spMkLst>
             <pc:docMk/>
             <pc:sldMk cId="2622195291" sldId="261"/>
@@ -1048,7 +1089,7 @@
           </ac:spMkLst>
         </pc:spChg>
         <pc:spChg chg="add mod">
-          <ac:chgData name="George John" userId="1c7f5d7288d1a48b" providerId="LiveId" clId="{0144DF34-647E-4BF4-ABCB-FB17BAA507B1}" dt="2023-10-30T22:40:49.785" v="3011" actId="207"/>
+          <ac:chgData name="George John" userId="1c7f5d7288d1a48b" providerId="LiveId" clId="{0144DF34-647E-4BF4-ABCB-FB17BAA507B1}" dt="2023-10-31T18:43:57.034" v="3288" actId="207"/>
           <ac:spMkLst>
             <pc:docMk/>
             <pc:sldMk cId="2622195291" sldId="261"/>
@@ -1064,6 +1105,22 @@
           </ac:spMkLst>
         </pc:spChg>
         <pc:spChg chg="add mod">
+          <ac:chgData name="George John" userId="1c7f5d7288d1a48b" providerId="LiveId" clId="{0144DF34-647E-4BF4-ABCB-FB17BAA507B1}" dt="2023-10-31T19:03:56.926" v="3485" actId="1037"/>
+          <ac:spMkLst>
+            <pc:docMk/>
+            <pc:sldMk cId="2622195291" sldId="261"/>
+            <ac:spMk id="32" creationId="{7F1544B7-70C7-A492-2A64-A09D011BA2C9}"/>
+          </ac:spMkLst>
+        </pc:spChg>
+        <pc:spChg chg="add mod">
+          <ac:chgData name="George John" userId="1c7f5d7288d1a48b" providerId="LiveId" clId="{0144DF34-647E-4BF4-ABCB-FB17BAA507B1}" dt="2023-10-31T19:10:43.294" v="3514" actId="20577"/>
+          <ac:spMkLst>
+            <pc:docMk/>
+            <pc:sldMk cId="2622195291" sldId="261"/>
+            <ac:spMk id="34" creationId="{02B66FED-805F-4FC2-4A69-60759EEF05EF}"/>
+          </ac:spMkLst>
+        </pc:spChg>
+        <pc:spChg chg="add mod">
           <ac:chgData name="George John" userId="1c7f5d7288d1a48b" providerId="LiveId" clId="{0144DF34-647E-4BF4-ABCB-FB17BAA507B1}" dt="2023-10-30T22:50:52.202" v="3149" actId="20577"/>
           <ac:spMkLst>
             <pc:docMk/>
@@ -1191,6 +1248,29 @@
             <ac:cxnSpMk id="38" creationId="{97185A02-32BC-C818-A9BC-6A8C8B3A0EE2}"/>
           </ac:cxnSpMkLst>
         </pc:cxnChg>
+      </pc:sldChg>
+      <pc:sldChg chg="addSp modSp new mod">
+        <pc:chgData name="George John" userId="1c7f5d7288d1a48b" providerId="LiveId" clId="{0144DF34-647E-4BF4-ABCB-FB17BAA507B1}" dt="2023-10-31T19:07:27.263" v="3502" actId="20577"/>
+        <pc:sldMkLst>
+          <pc:docMk/>
+          <pc:sldMk cId="349446590" sldId="262"/>
+        </pc:sldMkLst>
+        <pc:spChg chg="add mod">
+          <ac:chgData name="George John" userId="1c7f5d7288d1a48b" providerId="LiveId" clId="{0144DF34-647E-4BF4-ABCB-FB17BAA507B1}" dt="2023-10-31T19:07:27.263" v="3502" actId="20577"/>
+          <ac:spMkLst>
+            <pc:docMk/>
+            <pc:sldMk cId="349446590" sldId="262"/>
+            <ac:spMk id="4" creationId="{0C908AEE-05CC-09FE-C2C4-AE6CF6E1D9F5}"/>
+          </ac:spMkLst>
+        </pc:spChg>
+        <pc:picChg chg="add mod">
+          <ac:chgData name="George John" userId="1c7f5d7288d1a48b" providerId="LiveId" clId="{0144DF34-647E-4BF4-ABCB-FB17BAA507B1}" dt="2023-10-31T18:42:01.797" v="3166" actId="1038"/>
+          <ac:picMkLst>
+            <pc:docMk/>
+            <pc:sldMk cId="349446590" sldId="262"/>
+            <ac:picMk id="3" creationId="{BDD8726A-6AD6-6749-71F5-9B071A5A9653}"/>
+          </ac:picMkLst>
+        </pc:picChg>
       </pc:sldChg>
     </pc:docChg>
   </pc:docChgLst>
@@ -1328,7 +1408,7 @@
           <a:p>
             <a:fld id="{EA307E68-3151-4021-8034-6905DEC8B993}" type="datetimeFigureOut">
               <a:rPr lang="en-US" smtClean="0"/>
-              <a:t>10/30/2023</a:t>
+              <a:t>10/31/2023</a:t>
             </a:fld>
             <a:endParaRPr lang="en-US"/>
           </a:p>
@@ -1498,7 +1578,7 @@
           <a:p>
             <a:fld id="{EA307E68-3151-4021-8034-6905DEC8B993}" type="datetimeFigureOut">
               <a:rPr lang="en-US" smtClean="0"/>
-              <a:t>10/30/2023</a:t>
+              <a:t>10/31/2023</a:t>
             </a:fld>
             <a:endParaRPr lang="en-US"/>
           </a:p>
@@ -1678,7 +1758,7 @@
           <a:p>
             <a:fld id="{EA307E68-3151-4021-8034-6905DEC8B993}" type="datetimeFigureOut">
               <a:rPr lang="en-US" smtClean="0"/>
-              <a:t>10/30/2023</a:t>
+              <a:t>10/31/2023</a:t>
             </a:fld>
             <a:endParaRPr lang="en-US"/>
           </a:p>
@@ -1848,7 +1928,7 @@
           <a:p>
             <a:fld id="{EA307E68-3151-4021-8034-6905DEC8B993}" type="datetimeFigureOut">
               <a:rPr lang="en-US" smtClean="0"/>
-              <a:t>10/30/2023</a:t>
+              <a:t>10/31/2023</a:t>
             </a:fld>
             <a:endParaRPr lang="en-US"/>
           </a:p>
@@ -2092,7 +2172,7 @@
           <a:p>
             <a:fld id="{EA307E68-3151-4021-8034-6905DEC8B993}" type="datetimeFigureOut">
               <a:rPr lang="en-US" smtClean="0"/>
-              <a:t>10/30/2023</a:t>
+              <a:t>10/31/2023</a:t>
             </a:fld>
             <a:endParaRPr lang="en-US"/>
           </a:p>
@@ -2324,7 +2404,7 @@
           <a:p>
             <a:fld id="{EA307E68-3151-4021-8034-6905DEC8B993}" type="datetimeFigureOut">
               <a:rPr lang="en-US" smtClean="0"/>
-              <a:t>10/30/2023</a:t>
+              <a:t>10/31/2023</a:t>
             </a:fld>
             <a:endParaRPr lang="en-US"/>
           </a:p>
@@ -2691,7 +2771,7 @@
           <a:p>
             <a:fld id="{EA307E68-3151-4021-8034-6905DEC8B993}" type="datetimeFigureOut">
               <a:rPr lang="en-US" smtClean="0"/>
-              <a:t>10/30/2023</a:t>
+              <a:t>10/31/2023</a:t>
             </a:fld>
             <a:endParaRPr lang="en-US"/>
           </a:p>
@@ -2809,7 +2889,7 @@
           <a:p>
             <a:fld id="{EA307E68-3151-4021-8034-6905DEC8B993}" type="datetimeFigureOut">
               <a:rPr lang="en-US" smtClean="0"/>
-              <a:t>10/30/2023</a:t>
+              <a:t>10/31/2023</a:t>
             </a:fld>
             <a:endParaRPr lang="en-US"/>
           </a:p>
@@ -2904,7 +2984,7 @@
           <a:p>
             <a:fld id="{EA307E68-3151-4021-8034-6905DEC8B993}" type="datetimeFigureOut">
               <a:rPr lang="en-US" smtClean="0"/>
-              <a:t>10/30/2023</a:t>
+              <a:t>10/31/2023</a:t>
             </a:fld>
             <a:endParaRPr lang="en-US"/>
           </a:p>
@@ -3181,7 +3261,7 @@
           <a:p>
             <a:fld id="{EA307E68-3151-4021-8034-6905DEC8B993}" type="datetimeFigureOut">
               <a:rPr lang="en-US" smtClean="0"/>
-              <a:t>10/30/2023</a:t>
+              <a:t>10/31/2023</a:t>
             </a:fld>
             <a:endParaRPr lang="en-US"/>
           </a:p>
@@ -3438,7 +3518,7 @@
           <a:p>
             <a:fld id="{EA307E68-3151-4021-8034-6905DEC8B993}" type="datetimeFigureOut">
               <a:rPr lang="en-US" smtClean="0"/>
-              <a:t>10/30/2023</a:t>
+              <a:t>10/31/2023</a:t>
             </a:fld>
             <a:endParaRPr lang="en-US"/>
           </a:p>
@@ -3651,7 +3731,7 @@
           <a:p>
             <a:fld id="{EA307E68-3151-4021-8034-6905DEC8B993}" type="datetimeFigureOut">
               <a:rPr lang="en-US" smtClean="0"/>
-              <a:t>10/30/2023</a:t>
+              <a:t>10/31/2023</a:t>
             </a:fld>
             <a:endParaRPr lang="en-US"/>
           </a:p>
@@ -5532,7 +5612,7 @@
         <p:spPr>
           <a:xfrm>
             <a:off x="1817077" y="351692"/>
-            <a:ext cx="2889637" cy="369332"/>
+            <a:ext cx="3175293" cy="369332"/>
           </a:xfrm>
           <a:prstGeom prst="rect">
             <a:avLst/>
@@ -5547,7 +5627,7 @@
           <a:p>
             <a:r>
               <a:rPr lang="en-US" dirty="0"/>
-              <a:t>Screen Snap of Brett’s Phone</a:t>
+              <a:t>Screen Snap #1 of Brett’s Phone</a:t>
             </a:r>
           </a:p>
         </p:txBody>
@@ -5587,7 +5667,7 @@
           <p:cNvPr id="3" name="Picture 2">
             <a:extLst>
               <a:ext uri="{FF2B5EF4-FFF2-40B4-BE49-F238E27FC236}">
-                <a16:creationId xmlns:a16="http://schemas.microsoft.com/office/drawing/2014/main" id="{418689E5-E4A6-29FF-495C-F91A8A66ACA5}"/>
+                <a16:creationId xmlns:a16="http://schemas.microsoft.com/office/drawing/2014/main" id="{BDD8726A-6AD6-6749-71F5-9B071A5A9653}"/>
               </a:ext>
             </a:extLst>
           </p:cNvPr>
@@ -5604,59 +5684,20 @@
         </p:blipFill>
         <p:spPr>
           <a:xfrm>
-            <a:off x="1641159" y="1695216"/>
-            <a:ext cx="3575682" cy="2156913"/>
+            <a:off x="1569294" y="757732"/>
+            <a:ext cx="3742857" cy="7933333"/>
           </a:xfrm>
           <a:prstGeom prst="rect">
             <a:avLst/>
           </a:prstGeom>
         </p:spPr>
       </p:pic>
-      <p:cxnSp>
-        <p:nvCxnSpPr>
-          <p:cNvPr id="5" name="Straight Arrow Connector 4">
+      <p:sp>
+        <p:nvSpPr>
+          <p:cNvPr id="4" name="TextBox 3">
             <a:extLst>
               <a:ext uri="{FF2B5EF4-FFF2-40B4-BE49-F238E27FC236}">
-                <a16:creationId xmlns:a16="http://schemas.microsoft.com/office/drawing/2014/main" id="{89182AD7-CA8A-BB9E-D831-7C96A773EE0B}"/>
-              </a:ext>
-            </a:extLst>
-          </p:cNvPr>
-          <p:cNvCxnSpPr/>
-          <p:nvPr/>
-        </p:nvCxnSpPr>
-        <p:spPr>
-          <a:xfrm flipV="1">
-            <a:off x="2391508" y="3528646"/>
-            <a:ext cx="738554" cy="644769"/>
-          </a:xfrm>
-          <a:prstGeom prst="straightConnector1">
-            <a:avLst/>
-          </a:prstGeom>
-          <a:ln w="92075">
-            <a:tailEnd type="triangle"/>
-          </a:ln>
-        </p:spPr>
-        <p:style>
-          <a:lnRef idx="1">
-            <a:schemeClr val="accent2"/>
-          </a:lnRef>
-          <a:fillRef idx="0">
-            <a:schemeClr val="accent2"/>
-          </a:fillRef>
-          <a:effectRef idx="0">
-            <a:schemeClr val="accent2"/>
-          </a:effectRef>
-          <a:fontRef idx="minor">
-            <a:schemeClr val="tx1"/>
-          </a:fontRef>
-        </p:style>
-      </p:cxnSp>
-      <p:sp>
-        <p:nvSpPr>
-          <p:cNvPr id="6" name="TextBox 5">
-            <a:extLst>
-              <a:ext uri="{FF2B5EF4-FFF2-40B4-BE49-F238E27FC236}">
-                <a16:creationId xmlns:a16="http://schemas.microsoft.com/office/drawing/2014/main" id="{C1CEC779-45E1-67C7-FABB-12C35F05E15E}"/>
+                <a16:creationId xmlns:a16="http://schemas.microsoft.com/office/drawing/2014/main" id="{0C908AEE-05CC-09FE-C2C4-AE6CF6E1D9F5}"/>
               </a:ext>
             </a:extLst>
           </p:cNvPr>
@@ -5665,8 +5706,8 @@
         </p:nvSpPr>
         <p:spPr>
           <a:xfrm>
-            <a:off x="1816397" y="4173415"/>
-            <a:ext cx="1612603" cy="923330"/>
+            <a:off x="1817077" y="351692"/>
+            <a:ext cx="3175293" cy="369332"/>
           </a:xfrm>
           <a:prstGeom prst="rect">
             <a:avLst/>
@@ -5674,20 +5715,14 @@
           <a:noFill/>
         </p:spPr>
         <p:txBody>
-          <a:bodyPr wrap="square" rtlCol="0">
+          <a:bodyPr wrap="none" rtlCol="0">
             <a:spAutoFit/>
           </a:bodyPr>
           <a:lstStyle/>
           <a:p>
             <a:r>
-              <a:rPr lang="en-US" b="1" dirty="0">
-                <a:solidFill>
-                  <a:schemeClr val="accent2">
-                    <a:lumMod val="75000"/>
-                  </a:schemeClr>
-                </a:solidFill>
-              </a:rPr>
-              <a:t>This button not always visible</a:t>
+              <a:rPr lang="en-US" dirty="0"/>
+              <a:t>Screen Snap #2 of Brett’s Phone</a:t>
             </a:r>
           </a:p>
         </p:txBody>
@@ -5695,7 +5730,7 @@
     </p:spTree>
     <p:extLst>
       <p:ext uri="{BB962C8B-B14F-4D97-AF65-F5344CB8AC3E}">
-        <p14:creationId xmlns:p14="http://schemas.microsoft.com/office/powerpoint/2010/main" val="1522941257"/>
+        <p14:creationId xmlns:p14="http://schemas.microsoft.com/office/powerpoint/2010/main" val="349446590"/>
       </p:ext>
     </p:extLst>
   </p:cSld>
@@ -5722,6 +5757,258 @@
           <a:chExt cx="0" cy="0"/>
         </a:xfrm>
       </p:grpSpPr>
+      <p:pic>
+        <p:nvPicPr>
+          <p:cNvPr id="3" name="Picture 2">
+            <a:extLst>
+              <a:ext uri="{FF2B5EF4-FFF2-40B4-BE49-F238E27FC236}">
+                <a16:creationId xmlns:a16="http://schemas.microsoft.com/office/drawing/2014/main" id="{418689E5-E4A6-29FF-495C-F91A8A66ACA5}"/>
+              </a:ext>
+            </a:extLst>
+          </p:cNvPr>
+          <p:cNvPicPr>
+            <a:picLocks noChangeAspect="1"/>
+          </p:cNvPicPr>
+          <p:nvPr/>
+        </p:nvPicPr>
+        <p:blipFill>
+          <a:blip r:embed="rId2"/>
+          <a:stretch>
+            <a:fillRect/>
+          </a:stretch>
+        </p:blipFill>
+        <p:spPr>
+          <a:xfrm>
+            <a:off x="1641159" y="1695216"/>
+            <a:ext cx="3575682" cy="2156913"/>
+          </a:xfrm>
+          <a:prstGeom prst="rect">
+            <a:avLst/>
+          </a:prstGeom>
+        </p:spPr>
+      </p:pic>
+      <p:cxnSp>
+        <p:nvCxnSpPr>
+          <p:cNvPr id="5" name="Straight Arrow Connector 4">
+            <a:extLst>
+              <a:ext uri="{FF2B5EF4-FFF2-40B4-BE49-F238E27FC236}">
+                <a16:creationId xmlns:a16="http://schemas.microsoft.com/office/drawing/2014/main" id="{89182AD7-CA8A-BB9E-D831-7C96A773EE0B}"/>
+              </a:ext>
+            </a:extLst>
+          </p:cNvPr>
+          <p:cNvCxnSpPr/>
+          <p:nvPr/>
+        </p:nvCxnSpPr>
+        <p:spPr>
+          <a:xfrm flipV="1">
+            <a:off x="2391508" y="3528646"/>
+            <a:ext cx="738554" cy="644769"/>
+          </a:xfrm>
+          <a:prstGeom prst="straightConnector1">
+            <a:avLst/>
+          </a:prstGeom>
+          <a:ln w="92075">
+            <a:tailEnd type="triangle"/>
+          </a:ln>
+        </p:spPr>
+        <p:style>
+          <a:lnRef idx="1">
+            <a:schemeClr val="accent2"/>
+          </a:lnRef>
+          <a:fillRef idx="0">
+            <a:schemeClr val="accent2"/>
+          </a:fillRef>
+          <a:effectRef idx="0">
+            <a:schemeClr val="accent2"/>
+          </a:effectRef>
+          <a:fontRef idx="minor">
+            <a:schemeClr val="tx1"/>
+          </a:fontRef>
+        </p:style>
+      </p:cxnSp>
+      <p:sp>
+        <p:nvSpPr>
+          <p:cNvPr id="6" name="TextBox 5">
+            <a:extLst>
+              <a:ext uri="{FF2B5EF4-FFF2-40B4-BE49-F238E27FC236}">
+                <a16:creationId xmlns:a16="http://schemas.microsoft.com/office/drawing/2014/main" id="{C1CEC779-45E1-67C7-FABB-12C35F05E15E}"/>
+              </a:ext>
+            </a:extLst>
+          </p:cNvPr>
+          <p:cNvSpPr txBox="1"/>
+          <p:nvPr/>
+        </p:nvSpPr>
+        <p:spPr>
+          <a:xfrm>
+            <a:off x="1816397" y="4173415"/>
+            <a:ext cx="1612603" cy="923330"/>
+          </a:xfrm>
+          <a:prstGeom prst="rect">
+            <a:avLst/>
+          </a:prstGeom>
+          <a:noFill/>
+        </p:spPr>
+        <p:txBody>
+          <a:bodyPr wrap="square" rtlCol="0">
+            <a:spAutoFit/>
+          </a:bodyPr>
+          <a:lstStyle/>
+          <a:p>
+            <a:r>
+              <a:rPr lang="en-US" b="1" dirty="0">
+                <a:solidFill>
+                  <a:schemeClr val="accent2">
+                    <a:lumMod val="75000"/>
+                  </a:schemeClr>
+                </a:solidFill>
+              </a:rPr>
+              <a:t>This button not always visible</a:t>
+            </a:r>
+          </a:p>
+        </p:txBody>
+      </p:sp>
+      <p:pic>
+        <p:nvPicPr>
+          <p:cNvPr id="4" name="Picture 3">
+            <a:extLst>
+              <a:ext uri="{FF2B5EF4-FFF2-40B4-BE49-F238E27FC236}">
+                <a16:creationId xmlns:a16="http://schemas.microsoft.com/office/drawing/2014/main" id="{125FC532-61E8-40AD-12B1-0E94B0A0010D}"/>
+              </a:ext>
+            </a:extLst>
+          </p:cNvPr>
+          <p:cNvPicPr>
+            <a:picLocks noChangeAspect="1"/>
+          </p:cNvPicPr>
+          <p:nvPr/>
+        </p:nvPicPr>
+        <p:blipFill>
+          <a:blip r:embed="rId3"/>
+          <a:stretch>
+            <a:fillRect/>
+          </a:stretch>
+        </p:blipFill>
+        <p:spPr>
+          <a:xfrm>
+            <a:off x="2550881" y="6545371"/>
+            <a:ext cx="3771429" cy="2266667"/>
+          </a:xfrm>
+          <a:prstGeom prst="rect">
+            <a:avLst/>
+          </a:prstGeom>
+        </p:spPr>
+      </p:pic>
+      <p:cxnSp>
+        <p:nvCxnSpPr>
+          <p:cNvPr id="7" name="Straight Arrow Connector 6">
+            <a:extLst>
+              <a:ext uri="{FF2B5EF4-FFF2-40B4-BE49-F238E27FC236}">
+                <a16:creationId xmlns:a16="http://schemas.microsoft.com/office/drawing/2014/main" id="{11A595A2-7844-A506-7C2A-82C1FED4435E}"/>
+              </a:ext>
+            </a:extLst>
+          </p:cNvPr>
+          <p:cNvCxnSpPr>
+            <a:cxnSpLocks/>
+          </p:cNvCxnSpPr>
+          <p:nvPr/>
+        </p:nvCxnSpPr>
+        <p:spPr>
+          <a:xfrm>
+            <a:off x="2100690" y="6414451"/>
+            <a:ext cx="929113" cy="1078173"/>
+          </a:xfrm>
+          <a:prstGeom prst="straightConnector1">
+            <a:avLst/>
+          </a:prstGeom>
+          <a:ln w="92075">
+            <a:tailEnd type="triangle"/>
+          </a:ln>
+        </p:spPr>
+        <p:style>
+          <a:lnRef idx="1">
+            <a:schemeClr val="accent2"/>
+          </a:lnRef>
+          <a:fillRef idx="0">
+            <a:schemeClr val="accent2"/>
+          </a:fillRef>
+          <a:effectRef idx="0">
+            <a:schemeClr val="accent2"/>
+          </a:effectRef>
+          <a:fontRef idx="minor">
+            <a:schemeClr val="tx1"/>
+          </a:fontRef>
+        </p:style>
+      </p:cxnSp>
+      <p:sp>
+        <p:nvSpPr>
+          <p:cNvPr id="11" name="TextBox 10">
+            <a:extLst>
+              <a:ext uri="{FF2B5EF4-FFF2-40B4-BE49-F238E27FC236}">
+                <a16:creationId xmlns:a16="http://schemas.microsoft.com/office/drawing/2014/main" id="{33A7D8A4-B13F-6B06-29E3-15AB5E32F239}"/>
+              </a:ext>
+            </a:extLst>
+          </p:cNvPr>
+          <p:cNvSpPr txBox="1"/>
+          <p:nvPr/>
+        </p:nvSpPr>
+        <p:spPr>
+          <a:xfrm>
+            <a:off x="1421925" y="6068961"/>
+            <a:ext cx="1612603" cy="369332"/>
+          </a:xfrm>
+          <a:prstGeom prst="rect">
+            <a:avLst/>
+          </a:prstGeom>
+          <a:noFill/>
+        </p:spPr>
+        <p:txBody>
+          <a:bodyPr wrap="square" rtlCol="0">
+            <a:spAutoFit/>
+          </a:bodyPr>
+          <a:lstStyle/>
+          <a:p>
+            <a:r>
+              <a:rPr lang="en-US" b="1" dirty="0">
+                <a:solidFill>
+                  <a:schemeClr val="accent2">
+                    <a:lumMod val="75000"/>
+                  </a:schemeClr>
+                </a:solidFill>
+              </a:rPr>
+              <a:t>Added this</a:t>
+            </a:r>
+          </a:p>
+        </p:txBody>
+      </p:sp>
+    </p:spTree>
+    <p:extLst>
+      <p:ext uri="{BB962C8B-B14F-4D97-AF65-F5344CB8AC3E}">
+        <p14:creationId xmlns:p14="http://schemas.microsoft.com/office/powerpoint/2010/main" val="1522941257"/>
+      </p:ext>
+    </p:extLst>
+  </p:cSld>
+  <p:clrMapOvr>
+    <a:masterClrMapping/>
+  </p:clrMapOvr>
+</p:sld>
+</file>
+
+<file path=ppt/slides/slide6.xml><?xml version="1.0" encoding="utf-8"?>
+<p:sld xmlns:a="http://schemas.openxmlformats.org/drawingml/2006/main" xmlns:r="http://schemas.openxmlformats.org/officeDocument/2006/relationships" xmlns:p="http://schemas.openxmlformats.org/presentationml/2006/main">
+  <p:cSld>
+    <p:spTree>
+      <p:nvGrpSpPr>
+        <p:cNvPr id="1" name=""/>
+        <p:cNvGrpSpPr/>
+        <p:nvPr/>
+      </p:nvGrpSpPr>
+      <p:grpSpPr>
+        <a:xfrm>
+          <a:off x="0" y="0"/>
+          <a:ext cx="0" cy="0"/>
+          <a:chOff x="0" y="0"/>
+          <a:chExt cx="0" cy="0"/>
+        </a:xfrm>
+      </p:grpSpPr>
       <p:sp>
         <p:nvSpPr>
           <p:cNvPr id="2" name="TextBox 1">
@@ -6200,10 +6487,7 @@
               <a:avLst/>
             </a:prstGeom>
             <a:solidFill>
-              <a:schemeClr val="accent6">
-                <a:lumMod val="20000"/>
-                <a:lumOff val="80000"/>
-              </a:schemeClr>
+              <a:schemeClr val="bg1"/>
             </a:solidFill>
             <a:ln>
               <a:solidFill>
@@ -6284,10 +6568,7 @@
             <a:avLst/>
           </a:prstGeom>
           <a:solidFill>
-            <a:schemeClr val="accent4">
-              <a:lumMod val="20000"/>
-              <a:lumOff val="80000"/>
-            </a:schemeClr>
+            <a:schemeClr val="bg1"/>
           </a:solidFill>
           <a:ln>
             <a:solidFill>
@@ -6387,10 +6668,7 @@
               <a:avLst/>
             </a:prstGeom>
             <a:solidFill>
-              <a:schemeClr val="accent6">
-                <a:lumMod val="60000"/>
-                <a:lumOff val="40000"/>
-              </a:schemeClr>
+              <a:schemeClr val="bg1"/>
             </a:solidFill>
             <a:ln>
               <a:solidFill>
@@ -6405,7 +6683,7 @@
             <a:lstStyle/>
             <a:p>
               <a:pPr algn="ctr"/>
-              <a:endParaRPr lang="en-US">
+              <a:endParaRPr lang="en-US" dirty="0">
                 <a:solidFill>
                   <a:schemeClr val="tx1"/>
                 </a:solidFill>
@@ -6491,10 +6769,7 @@
               <a:avLst/>
             </a:prstGeom>
             <a:solidFill>
-              <a:schemeClr val="accent4">
-                <a:lumMod val="60000"/>
-                <a:lumOff val="40000"/>
-              </a:schemeClr>
+              <a:schemeClr val="bg1"/>
             </a:solidFill>
             <a:ln>
               <a:solidFill>
@@ -6743,8 +7018,8 @@
         </p:nvSpPr>
         <p:spPr>
           <a:xfrm>
-            <a:off x="2121815" y="952885"/>
-            <a:ext cx="3164407" cy="738664"/>
+            <a:off x="1554346" y="952885"/>
+            <a:ext cx="4268778" cy="738664"/>
           </a:xfrm>
           <a:prstGeom prst="rect">
             <a:avLst/>
@@ -6759,7 +7034,7 @@
           <a:p>
             <a:r>
               <a:rPr lang="en-US" sz="1400" dirty="0"/>
-              <a:t>NextDoor allows members to choose between at least 5 different methods to access the platform</a:t>
+              <a:t>NextDoor allows members to choose between at least 5 different methods to access the platform. These different clients offer slightly different user experiences</a:t>
             </a:r>
           </a:p>
         </p:txBody>
@@ -6779,7 +7054,7 @@
         <p:spPr>
           <a:xfrm>
             <a:off x="1325033" y="4601958"/>
-            <a:ext cx="2402531" cy="1815882"/>
+            <a:ext cx="2402531" cy="1384995"/>
           </a:xfrm>
           <a:prstGeom prst="rect">
             <a:avLst/>
@@ -6795,15 +7070,7 @@
             <a:pPr marL="288925" indent="-288925"/>
             <a:r>
               <a:rPr lang="en-US" sz="1400" dirty="0"/>
-              <a:t>2.	Does </a:t>
-            </a:r>
-            <a:r>
-              <a:rPr lang="en-US" sz="1400" u="sng" dirty="0"/>
-              <a:t>not</a:t>
-            </a:r>
-            <a:r>
-              <a:rPr lang="en-US" sz="1400" dirty="0"/>
-              <a:t> provide </a:t>
+              <a:t>2.	</a:t>
             </a:r>
             <a:r>
               <a:rPr lang="en-US" sz="1400" b="1" dirty="0"/>
@@ -6811,7 +7078,7 @@
             </a:r>
             <a:r>
               <a:rPr lang="en-US" sz="1400" dirty="0"/>
-              <a:t> for posting to multiple specified groups including “anyone on NextDoor”</a:t>
+              <a:t> is located on NextDoor Home page.</a:t>
             </a:r>
           </a:p>
           <a:p>
@@ -6826,7 +7093,7 @@
             </a:r>
             <a:r>
               <a:rPr lang="en-US" sz="1400" dirty="0"/>
-              <a:t> for posting to specified groups including “anyone on NextDoor”</a:t>
+              <a:t> located within PLF for posting to specified groups including “anyone on NextDoor”</a:t>
             </a:r>
           </a:p>
         </p:txBody>
@@ -6878,8 +7145,11 @@
           <a:p>
             <a:r>
               <a:rPr lang="en-US" dirty="0"/>
-              <a:t>Web Browser on Android Phone</a:t>
-            </a:r>
+              <a:t>Web Browser on Android</a:t>
+            </a:r>
+          </a:p>
+          <a:p>
+            <a:endParaRPr lang="en-US" dirty="0"/>
           </a:p>
         </p:txBody>
       </p:sp>
@@ -6939,10 +7209,7 @@
             <a:avLst/>
           </a:prstGeom>
           <a:solidFill>
-            <a:schemeClr val="accent2">
-              <a:lumMod val="20000"/>
-              <a:lumOff val="80000"/>
-            </a:schemeClr>
+            <a:schemeClr val="bg1"/>
           </a:solidFill>
           <a:ln>
             <a:solidFill>
@@ -7201,6 +7468,182 @@
           </a:p>
         </p:txBody>
       </p:sp>
+      <p:sp>
+        <p:nvSpPr>
+          <p:cNvPr id="8" name="TextBox 7">
+            <a:extLst>
+              <a:ext uri="{FF2B5EF4-FFF2-40B4-BE49-F238E27FC236}">
+                <a16:creationId xmlns:a16="http://schemas.microsoft.com/office/drawing/2014/main" id="{E268462F-70FA-9697-7571-BA87C95B0FCE}"/>
+              </a:ext>
+            </a:extLst>
+          </p:cNvPr>
+          <p:cNvSpPr txBox="1"/>
+          <p:nvPr/>
+        </p:nvSpPr>
+        <p:spPr>
+          <a:xfrm>
+            <a:off x="4274894" y="3996109"/>
+            <a:ext cx="768214" cy="415498"/>
+          </a:xfrm>
+          <a:prstGeom prst="rect">
+            <a:avLst/>
+          </a:prstGeom>
+          <a:noFill/>
+        </p:spPr>
+        <p:txBody>
+          <a:bodyPr wrap="square" rtlCol="0">
+            <a:spAutoFit/>
+          </a:bodyPr>
+          <a:lstStyle/>
+          <a:p>
+            <a:pPr marL="114300" indent="-114300">
+              <a:buFont typeface="Arial" panose="020B0604020202020204" pitchFamily="34" charset="0"/>
+              <a:buChar char="•"/>
+            </a:pPr>
+            <a:r>
+              <a:rPr lang="en-US" sz="1050" dirty="0"/>
+              <a:t>Edge</a:t>
+            </a:r>
+          </a:p>
+          <a:p>
+            <a:pPr marL="114300" indent="-114300">
+              <a:buFont typeface="Arial" panose="020B0604020202020204" pitchFamily="34" charset="0"/>
+              <a:buChar char="•"/>
+            </a:pPr>
+            <a:r>
+              <a:rPr lang="en-US" sz="1050" dirty="0"/>
+              <a:t>Chrome</a:t>
+            </a:r>
+          </a:p>
+        </p:txBody>
+      </p:sp>
+      <p:sp>
+        <p:nvSpPr>
+          <p:cNvPr id="13" name="TextBox 12">
+            <a:extLst>
+              <a:ext uri="{FF2B5EF4-FFF2-40B4-BE49-F238E27FC236}">
+                <a16:creationId xmlns:a16="http://schemas.microsoft.com/office/drawing/2014/main" id="{CC9B8F94-E87E-5CEF-F148-56B3250D1A4B}"/>
+              </a:ext>
+            </a:extLst>
+          </p:cNvPr>
+          <p:cNvSpPr txBox="1"/>
+          <p:nvPr/>
+        </p:nvSpPr>
+        <p:spPr>
+          <a:xfrm>
+            <a:off x="4933003" y="4006740"/>
+            <a:ext cx="677373" cy="415498"/>
+          </a:xfrm>
+          <a:prstGeom prst="rect">
+            <a:avLst/>
+          </a:prstGeom>
+          <a:noFill/>
+        </p:spPr>
+        <p:txBody>
+          <a:bodyPr wrap="square" rtlCol="0">
+            <a:spAutoFit/>
+          </a:bodyPr>
+          <a:lstStyle/>
+          <a:p>
+            <a:pPr marL="114300" indent="-114300">
+              <a:buFont typeface="Arial" panose="020B0604020202020204" pitchFamily="34" charset="0"/>
+              <a:buChar char="•"/>
+            </a:pPr>
+            <a:r>
+              <a:rPr lang="en-US" sz="1050" dirty="0"/>
+              <a:t>Firefox</a:t>
+            </a:r>
+          </a:p>
+          <a:p>
+            <a:pPr marL="114300" indent="-114300">
+              <a:buFont typeface="Arial" panose="020B0604020202020204" pitchFamily="34" charset="0"/>
+              <a:buChar char="•"/>
+            </a:pPr>
+            <a:r>
+              <a:rPr lang="en-US" sz="1050" dirty="0"/>
+              <a:t>Opera</a:t>
+            </a:r>
+          </a:p>
+        </p:txBody>
+      </p:sp>
+      <p:sp>
+        <p:nvSpPr>
+          <p:cNvPr id="32" name="TextBox 31">
+            <a:extLst>
+              <a:ext uri="{FF2B5EF4-FFF2-40B4-BE49-F238E27FC236}">
+                <a16:creationId xmlns:a16="http://schemas.microsoft.com/office/drawing/2014/main" id="{7F1544B7-70C7-A492-2A64-A09D011BA2C9}"/>
+              </a:ext>
+            </a:extLst>
+          </p:cNvPr>
+          <p:cNvSpPr txBox="1"/>
+          <p:nvPr/>
+        </p:nvSpPr>
+        <p:spPr>
+          <a:xfrm>
+            <a:off x="4289684" y="5325748"/>
+            <a:ext cx="768214" cy="253916"/>
+          </a:xfrm>
+          <a:prstGeom prst="rect">
+            <a:avLst/>
+          </a:prstGeom>
+          <a:noFill/>
+        </p:spPr>
+        <p:txBody>
+          <a:bodyPr wrap="square" rtlCol="0">
+            <a:spAutoFit/>
+          </a:bodyPr>
+          <a:lstStyle/>
+          <a:p>
+            <a:pPr marL="114300" indent="-114300">
+              <a:buFont typeface="Arial" panose="020B0604020202020204" pitchFamily="34" charset="0"/>
+              <a:buChar char="•"/>
+            </a:pPr>
+            <a:r>
+              <a:rPr lang="en-US" sz="1050" dirty="0"/>
+              <a:t>Safari</a:t>
+            </a:r>
+          </a:p>
+        </p:txBody>
+      </p:sp>
+      <p:sp>
+        <p:nvSpPr>
+          <p:cNvPr id="34" name="TextBox 33">
+            <a:extLst>
+              <a:ext uri="{FF2B5EF4-FFF2-40B4-BE49-F238E27FC236}">
+                <a16:creationId xmlns:a16="http://schemas.microsoft.com/office/drawing/2014/main" id="{02B66FED-805F-4FC2-4A69-60759EEF05EF}"/>
+              </a:ext>
+            </a:extLst>
+          </p:cNvPr>
+          <p:cNvSpPr txBox="1"/>
+          <p:nvPr/>
+        </p:nvSpPr>
+        <p:spPr>
+          <a:xfrm>
+            <a:off x="4302966" y="2781507"/>
+            <a:ext cx="768214" cy="253916"/>
+          </a:xfrm>
+          <a:prstGeom prst="rect">
+            <a:avLst/>
+          </a:prstGeom>
+          <a:noFill/>
+        </p:spPr>
+        <p:txBody>
+          <a:bodyPr wrap="square" rtlCol="0">
+            <a:spAutoFit/>
+          </a:bodyPr>
+          <a:lstStyle/>
+          <a:p>
+            <a:pPr marL="114300" indent="-114300">
+              <a:buFont typeface="Arial" panose="020B0604020202020204" pitchFamily="34" charset="0"/>
+              <a:buChar char="•"/>
+            </a:pPr>
+            <a:r>
+              <a:rPr lang="en-US" sz="1050" dirty="0"/>
+              <a:t>Chrome</a:t>
+            </a:r>
+          </a:p>
+        </p:txBody>
+      </p:sp>
     </p:spTree>
     <p:extLst>
       <p:ext uri="{BB962C8B-B14F-4D97-AF65-F5344CB8AC3E}">
@@ -7214,7 +7657,7 @@
 </p:sld>
 </file>
 
-<file path=ppt/slides/slide6.xml><?xml version="1.0" encoding="utf-8"?>
+<file path=ppt/slides/slide7.xml><?xml version="1.0" encoding="utf-8"?>
 <p:sld xmlns:a="http://schemas.openxmlformats.org/drawingml/2006/main" xmlns:r="http://schemas.openxmlformats.org/officeDocument/2006/relationships" xmlns:p="http://schemas.openxmlformats.org/presentationml/2006/main">
   <p:cSld>
     <p:spTree>

</xml_diff>